<commit_message>
Fix of label in one of the charts
</commit_message>
<xml_diff>
--- a/prezentacja_progres.pptx
+++ b/prezentacja_progres.pptx
@@ -1978,7 +1978,7 @@
           <a:p>
             <a:fld id="{3A98996A-526F-4D12-9A3C-180E559B5F8A}" type="datetimeFigureOut">
               <a:rPr lang="pl-PL" smtClean="0"/>
-              <a:t>18.04.2022</a:t>
+              <a:t>19.04.2022</a:t>
             </a:fld>
             <a:endParaRPr lang="pl-PL"/>
           </a:p>
@@ -2392,7 +2392,7 @@
           <a:p>
             <a:fld id="{25F7A364-0BB9-45DB-85EC-48469DF6681C}" type="datetimeFigureOut">
               <a:rPr lang="pl-PL" smtClean="0"/>
-              <a:t>18.04.2022</a:t>
+              <a:t>19.04.2022</a:t>
             </a:fld>
             <a:endParaRPr lang="pl-PL"/>
           </a:p>
@@ -2590,7 +2590,7 @@
           <a:p>
             <a:fld id="{25F7A364-0BB9-45DB-85EC-48469DF6681C}" type="datetimeFigureOut">
               <a:rPr lang="pl-PL" smtClean="0"/>
-              <a:t>18.04.2022</a:t>
+              <a:t>19.04.2022</a:t>
             </a:fld>
             <a:endParaRPr lang="pl-PL"/>
           </a:p>
@@ -2798,7 +2798,7 @@
           <a:p>
             <a:fld id="{25F7A364-0BB9-45DB-85EC-48469DF6681C}" type="datetimeFigureOut">
               <a:rPr lang="pl-PL" smtClean="0"/>
-              <a:t>18.04.2022</a:t>
+              <a:t>19.04.2022</a:t>
             </a:fld>
             <a:endParaRPr lang="pl-PL"/>
           </a:p>
@@ -2996,7 +2996,7 @@
           <a:p>
             <a:fld id="{25F7A364-0BB9-45DB-85EC-48469DF6681C}" type="datetimeFigureOut">
               <a:rPr lang="pl-PL" smtClean="0"/>
-              <a:t>18.04.2022</a:t>
+              <a:t>19.04.2022</a:t>
             </a:fld>
             <a:endParaRPr lang="pl-PL"/>
           </a:p>
@@ -3271,7 +3271,7 @@
           <a:p>
             <a:fld id="{25F7A364-0BB9-45DB-85EC-48469DF6681C}" type="datetimeFigureOut">
               <a:rPr lang="pl-PL" smtClean="0"/>
-              <a:t>18.04.2022</a:t>
+              <a:t>19.04.2022</a:t>
             </a:fld>
             <a:endParaRPr lang="pl-PL"/>
           </a:p>
@@ -3536,7 +3536,7 @@
           <a:p>
             <a:fld id="{25F7A364-0BB9-45DB-85EC-48469DF6681C}" type="datetimeFigureOut">
               <a:rPr lang="pl-PL" smtClean="0"/>
-              <a:t>18.04.2022</a:t>
+              <a:t>19.04.2022</a:t>
             </a:fld>
             <a:endParaRPr lang="pl-PL"/>
           </a:p>
@@ -3948,7 +3948,7 @@
           <a:p>
             <a:fld id="{25F7A364-0BB9-45DB-85EC-48469DF6681C}" type="datetimeFigureOut">
               <a:rPr lang="pl-PL" smtClean="0"/>
-              <a:t>18.04.2022</a:t>
+              <a:t>19.04.2022</a:t>
             </a:fld>
             <a:endParaRPr lang="pl-PL"/>
           </a:p>
@@ -4089,7 +4089,7 @@
           <a:p>
             <a:fld id="{25F7A364-0BB9-45DB-85EC-48469DF6681C}" type="datetimeFigureOut">
               <a:rPr lang="pl-PL" smtClean="0"/>
-              <a:t>18.04.2022</a:t>
+              <a:t>19.04.2022</a:t>
             </a:fld>
             <a:endParaRPr lang="pl-PL"/>
           </a:p>
@@ -4202,7 +4202,7 @@
           <a:p>
             <a:fld id="{25F7A364-0BB9-45DB-85EC-48469DF6681C}" type="datetimeFigureOut">
               <a:rPr lang="pl-PL" smtClean="0"/>
-              <a:t>18.04.2022</a:t>
+              <a:t>19.04.2022</a:t>
             </a:fld>
             <a:endParaRPr lang="pl-PL"/>
           </a:p>
@@ -4513,7 +4513,7 @@
           <a:p>
             <a:fld id="{25F7A364-0BB9-45DB-85EC-48469DF6681C}" type="datetimeFigureOut">
               <a:rPr lang="pl-PL" smtClean="0"/>
-              <a:t>18.04.2022</a:t>
+              <a:t>19.04.2022</a:t>
             </a:fld>
             <a:endParaRPr lang="pl-PL"/>
           </a:p>
@@ -4801,7 +4801,7 @@
           <a:p>
             <a:fld id="{25F7A364-0BB9-45DB-85EC-48469DF6681C}" type="datetimeFigureOut">
               <a:rPr lang="pl-PL" smtClean="0"/>
-              <a:t>18.04.2022</a:t>
+              <a:t>19.04.2022</a:t>
             </a:fld>
             <a:endParaRPr lang="pl-PL"/>
           </a:p>
@@ -5042,7 +5042,7 @@
           <a:p>
             <a:fld id="{25F7A364-0BB9-45DB-85EC-48469DF6681C}" type="datetimeFigureOut">
               <a:rPr lang="pl-PL" smtClean="0"/>
-              <a:t>18.04.2022</a:t>
+              <a:t>19.04.2022</a:t>
             </a:fld>
             <a:endParaRPr lang="pl-PL"/>
           </a:p>
@@ -6868,10 +6868,10 @@
       </p:cxnSp>
       <p:pic>
         <p:nvPicPr>
-          <p:cNvPr id="11" name="Obraz 10">
-            <a:extLst>
-              <a:ext uri="{FF2B5EF4-FFF2-40B4-BE49-F238E27FC236}">
-                <a16:creationId xmlns:a16="http://schemas.microsoft.com/office/drawing/2014/main" id="{7A4847A2-5153-4AEB-8FE5-7A650E431789}"/>
+          <p:cNvPr id="6" name="Obraz 5">
+            <a:extLst>
+              <a:ext uri="{FF2B5EF4-FFF2-40B4-BE49-F238E27FC236}">
+                <a16:creationId xmlns:a16="http://schemas.microsoft.com/office/drawing/2014/main" id="{E607C30C-B1C0-41A4-BBA7-746768056C0F}"/>
               </a:ext>
             </a:extLst>
           </p:cNvPr>
@@ -6894,8 +6894,8 @@
         </p:blipFill>
         <p:spPr>
           <a:xfrm>
-            <a:off x="2649196" y="2569273"/>
-            <a:ext cx="6237833" cy="3225763"/>
+            <a:off x="2936433" y="2362042"/>
+            <a:ext cx="6319134" cy="3278503"/>
           </a:xfrm>
           <a:prstGeom prst="rect">
             <a:avLst/>

</xml_diff>

<commit_message>
Radiation models for different param
</commit_message>
<xml_diff>
--- a/prezentacja_progres.pptx
+++ b/prezentacja_progres.pptx
@@ -5,7 +5,7 @@
     <p:sldMasterId id="2147483648" r:id="rId1"/>
   </p:sldMasterIdLst>
   <p:notesMasterIdLst>
-    <p:notesMasterId r:id="rId12"/>
+    <p:notesMasterId r:id="rId18"/>
   </p:notesMasterIdLst>
   <p:sldIdLst>
     <p:sldId id="257" r:id="rId2"/>
@@ -18,6 +18,12 @@
     <p:sldId id="268" r:id="rId9"/>
     <p:sldId id="269" r:id="rId10"/>
     <p:sldId id="270" r:id="rId11"/>
+    <p:sldId id="271" r:id="rId12"/>
+    <p:sldId id="272" r:id="rId13"/>
+    <p:sldId id="273" r:id="rId14"/>
+    <p:sldId id="274" r:id="rId15"/>
+    <p:sldId id="275" r:id="rId16"/>
+    <p:sldId id="276" r:id="rId17"/>
   </p:sldIdLst>
   <p:sldSz cx="12192000" cy="6858000"/>
   <p:notesSz cx="6858000" cy="9144000"/>
@@ -131,6 +137,12 @@
             <p14:sldId id="268"/>
             <p14:sldId id="269"/>
             <p14:sldId id="270"/>
+            <p14:sldId id="271"/>
+            <p14:sldId id="272"/>
+            <p14:sldId id="273"/>
+            <p14:sldId id="274"/>
+            <p14:sldId id="275"/>
+            <p14:sldId id="276"/>
           </p14:sldIdLst>
         </p14:section>
       </p14:sectionLst>
@@ -1978,7 +1990,7 @@
           <a:p>
             <a:fld id="{3A98996A-526F-4D12-9A3C-180E559B5F8A}" type="datetimeFigureOut">
               <a:rPr lang="pl-PL" smtClean="0"/>
-              <a:t>19.04.2022</a:t>
+              <a:t>18.05.2022</a:t>
             </a:fld>
             <a:endParaRPr lang="pl-PL"/>
           </a:p>
@@ -2392,7 +2404,7 @@
           <a:p>
             <a:fld id="{25F7A364-0BB9-45DB-85EC-48469DF6681C}" type="datetimeFigureOut">
               <a:rPr lang="pl-PL" smtClean="0"/>
-              <a:t>19.04.2022</a:t>
+              <a:t>18.05.2022</a:t>
             </a:fld>
             <a:endParaRPr lang="pl-PL"/>
           </a:p>
@@ -2590,7 +2602,7 @@
           <a:p>
             <a:fld id="{25F7A364-0BB9-45DB-85EC-48469DF6681C}" type="datetimeFigureOut">
               <a:rPr lang="pl-PL" smtClean="0"/>
-              <a:t>19.04.2022</a:t>
+              <a:t>18.05.2022</a:t>
             </a:fld>
             <a:endParaRPr lang="pl-PL"/>
           </a:p>
@@ -2798,7 +2810,7 @@
           <a:p>
             <a:fld id="{25F7A364-0BB9-45DB-85EC-48469DF6681C}" type="datetimeFigureOut">
               <a:rPr lang="pl-PL" smtClean="0"/>
-              <a:t>19.04.2022</a:t>
+              <a:t>18.05.2022</a:t>
             </a:fld>
             <a:endParaRPr lang="pl-PL"/>
           </a:p>
@@ -2996,7 +3008,7 @@
           <a:p>
             <a:fld id="{25F7A364-0BB9-45DB-85EC-48469DF6681C}" type="datetimeFigureOut">
               <a:rPr lang="pl-PL" smtClean="0"/>
-              <a:t>19.04.2022</a:t>
+              <a:t>18.05.2022</a:t>
             </a:fld>
             <a:endParaRPr lang="pl-PL"/>
           </a:p>
@@ -3271,7 +3283,7 @@
           <a:p>
             <a:fld id="{25F7A364-0BB9-45DB-85EC-48469DF6681C}" type="datetimeFigureOut">
               <a:rPr lang="pl-PL" smtClean="0"/>
-              <a:t>19.04.2022</a:t>
+              <a:t>18.05.2022</a:t>
             </a:fld>
             <a:endParaRPr lang="pl-PL"/>
           </a:p>
@@ -3536,7 +3548,7 @@
           <a:p>
             <a:fld id="{25F7A364-0BB9-45DB-85EC-48469DF6681C}" type="datetimeFigureOut">
               <a:rPr lang="pl-PL" smtClean="0"/>
-              <a:t>19.04.2022</a:t>
+              <a:t>18.05.2022</a:t>
             </a:fld>
             <a:endParaRPr lang="pl-PL"/>
           </a:p>
@@ -3948,7 +3960,7 @@
           <a:p>
             <a:fld id="{25F7A364-0BB9-45DB-85EC-48469DF6681C}" type="datetimeFigureOut">
               <a:rPr lang="pl-PL" smtClean="0"/>
-              <a:t>19.04.2022</a:t>
+              <a:t>18.05.2022</a:t>
             </a:fld>
             <a:endParaRPr lang="pl-PL"/>
           </a:p>
@@ -4089,7 +4101,7 @@
           <a:p>
             <a:fld id="{25F7A364-0BB9-45DB-85EC-48469DF6681C}" type="datetimeFigureOut">
               <a:rPr lang="pl-PL" smtClean="0"/>
-              <a:t>19.04.2022</a:t>
+              <a:t>18.05.2022</a:t>
             </a:fld>
             <a:endParaRPr lang="pl-PL"/>
           </a:p>
@@ -4202,7 +4214,7 @@
           <a:p>
             <a:fld id="{25F7A364-0BB9-45DB-85EC-48469DF6681C}" type="datetimeFigureOut">
               <a:rPr lang="pl-PL" smtClean="0"/>
-              <a:t>19.04.2022</a:t>
+              <a:t>18.05.2022</a:t>
             </a:fld>
             <a:endParaRPr lang="pl-PL"/>
           </a:p>
@@ -4513,7 +4525,7 @@
           <a:p>
             <a:fld id="{25F7A364-0BB9-45DB-85EC-48469DF6681C}" type="datetimeFigureOut">
               <a:rPr lang="pl-PL" smtClean="0"/>
-              <a:t>19.04.2022</a:t>
+              <a:t>18.05.2022</a:t>
             </a:fld>
             <a:endParaRPr lang="pl-PL"/>
           </a:p>
@@ -4801,7 +4813,7 @@
           <a:p>
             <a:fld id="{25F7A364-0BB9-45DB-85EC-48469DF6681C}" type="datetimeFigureOut">
               <a:rPr lang="pl-PL" smtClean="0"/>
-              <a:t>19.04.2022</a:t>
+              <a:t>18.05.2022</a:t>
             </a:fld>
             <a:endParaRPr lang="pl-PL"/>
           </a:p>
@@ -5042,7 +5054,7 @@
           <a:p>
             <a:fld id="{25F7A364-0BB9-45DB-85EC-48469DF6681C}" type="datetimeFigureOut">
               <a:rPr lang="pl-PL" smtClean="0"/>
-              <a:t>19.04.2022</a:t>
+              <a:t>18.05.2022</a:t>
             </a:fld>
             <a:endParaRPr lang="pl-PL"/>
           </a:p>
@@ -5884,6 +5896,1205 @@
     <p:extLst>
       <p:ext uri="{BB962C8B-B14F-4D97-AF65-F5344CB8AC3E}">
         <p14:creationId xmlns:p14="http://schemas.microsoft.com/office/powerpoint/2010/main" val="1322964419"/>
+      </p:ext>
+    </p:extLst>
+  </p:cSld>
+  <p:clrMapOvr>
+    <a:masterClrMapping/>
+  </p:clrMapOvr>
+</p:sld>
+</file>
+
+<file path=ppt/slides/slide11.xml><?xml version="1.0" encoding="utf-8"?>
+<p:sld xmlns:a="http://schemas.openxmlformats.org/drawingml/2006/main" xmlns:r="http://schemas.openxmlformats.org/officeDocument/2006/relationships" xmlns:p="http://schemas.openxmlformats.org/presentationml/2006/main">
+  <p:cSld>
+    <p:spTree>
+      <p:nvGrpSpPr>
+        <p:cNvPr id="1" name=""/>
+        <p:cNvGrpSpPr/>
+        <p:nvPr/>
+      </p:nvGrpSpPr>
+      <p:grpSpPr>
+        <a:xfrm>
+          <a:off x="0" y="0"/>
+          <a:ext cx="0" cy="0"/>
+          <a:chOff x="0" y="0"/>
+          <a:chExt cx="0" cy="0"/>
+        </a:xfrm>
+      </p:grpSpPr>
+      <p:sp>
+        <p:nvSpPr>
+          <p:cNvPr id="2" name="Tytuł 1">
+            <a:extLst>
+              <a:ext uri="{FF2B5EF4-FFF2-40B4-BE49-F238E27FC236}">
+                <a16:creationId xmlns:a16="http://schemas.microsoft.com/office/drawing/2014/main" id="{846B20A1-DF77-49E9-9FC9-D8D9FFADA71B}"/>
+              </a:ext>
+            </a:extLst>
+          </p:cNvPr>
+          <p:cNvSpPr>
+            <a:spLocks noGrp="1"/>
+          </p:cNvSpPr>
+          <p:nvPr>
+            <p:ph type="title"/>
+          </p:nvPr>
+        </p:nvSpPr>
+        <p:spPr/>
+        <p:txBody>
+          <a:bodyPr/>
+          <a:lstStyle/>
+          <a:p>
+            <a:r>
+              <a:rPr lang="pl-PL" dirty="0">
+                <a:solidFill>
+                  <a:schemeClr val="accent1">
+                    <a:lumMod val="75000"/>
+                  </a:schemeClr>
+                </a:solidFill>
+              </a:rPr>
+              <a:t>RMSE in </a:t>
+            </a:r>
+            <a:r>
+              <a:rPr lang="pl-PL" dirty="0" err="1">
+                <a:solidFill>
+                  <a:schemeClr val="accent1">
+                    <a:lumMod val="75000"/>
+                  </a:schemeClr>
+                </a:solidFill>
+              </a:rPr>
+              <a:t>space</a:t>
+            </a:r>
+            <a:endParaRPr lang="pl-PL" dirty="0">
+              <a:solidFill>
+                <a:schemeClr val="accent1">
+                  <a:lumMod val="75000"/>
+                </a:schemeClr>
+              </a:solidFill>
+            </a:endParaRPr>
+          </a:p>
+        </p:txBody>
+      </p:sp>
+      <p:pic>
+        <p:nvPicPr>
+          <p:cNvPr id="10" name="Symbol zastępczy zawartości 9">
+            <a:extLst>
+              <a:ext uri="{FF2B5EF4-FFF2-40B4-BE49-F238E27FC236}">
+                <a16:creationId xmlns:a16="http://schemas.microsoft.com/office/drawing/2014/main" id="{E3EB80FD-54DF-0D09-74AF-EA7CD3626461}"/>
+              </a:ext>
+            </a:extLst>
+          </p:cNvPr>
+          <p:cNvPicPr>
+            <a:picLocks noGrp="1" noChangeAspect="1"/>
+          </p:cNvPicPr>
+          <p:nvPr>
+            <p:ph idx="1"/>
+          </p:nvPr>
+        </p:nvPicPr>
+        <p:blipFill>
+          <a:blip r:embed="rId2">
+            <a:extLst>
+              <a:ext uri="{28A0092B-C50C-407E-A947-70E740481C1C}">
+                <a14:useLocalDpi xmlns:a14="http://schemas.microsoft.com/office/drawing/2010/main" val="0"/>
+              </a:ext>
+            </a:extLst>
+          </a:blip>
+          <a:stretch>
+            <a:fillRect/>
+          </a:stretch>
+        </p:blipFill>
+        <p:spPr>
+          <a:xfrm>
+            <a:off x="3908840" y="1825625"/>
+            <a:ext cx="4374320" cy="4351338"/>
+          </a:xfrm>
+        </p:spPr>
+      </p:pic>
+      <p:cxnSp>
+        <p:nvCxnSpPr>
+          <p:cNvPr id="5" name="Łącznik prosty 4">
+            <a:extLst>
+              <a:ext uri="{FF2B5EF4-FFF2-40B4-BE49-F238E27FC236}">
+                <a16:creationId xmlns:a16="http://schemas.microsoft.com/office/drawing/2014/main" id="{3B41ED5C-B54D-4CD7-BD3A-74F3EBB43590}"/>
+              </a:ext>
+            </a:extLst>
+          </p:cNvPr>
+          <p:cNvCxnSpPr/>
+          <p:nvPr/>
+        </p:nvCxnSpPr>
+        <p:spPr>
+          <a:xfrm>
+            <a:off x="0" y="1434517"/>
+            <a:ext cx="12192000" cy="0"/>
+          </a:xfrm>
+          <a:prstGeom prst="line">
+            <a:avLst/>
+          </a:prstGeom>
+          <a:ln w="38100">
+            <a:solidFill>
+              <a:schemeClr val="accent1">
+                <a:lumMod val="75000"/>
+              </a:schemeClr>
+            </a:solidFill>
+          </a:ln>
+        </p:spPr>
+        <p:style>
+          <a:lnRef idx="1">
+            <a:schemeClr val="accent1"/>
+          </a:lnRef>
+          <a:fillRef idx="0">
+            <a:schemeClr val="accent1"/>
+          </a:fillRef>
+          <a:effectRef idx="0">
+            <a:schemeClr val="accent1"/>
+          </a:effectRef>
+          <a:fontRef idx="minor">
+            <a:schemeClr val="tx1"/>
+          </a:fontRef>
+        </p:style>
+      </p:cxnSp>
+    </p:spTree>
+    <p:extLst>
+      <p:ext uri="{BB962C8B-B14F-4D97-AF65-F5344CB8AC3E}">
+        <p14:creationId xmlns:p14="http://schemas.microsoft.com/office/powerpoint/2010/main" val="990032483"/>
+      </p:ext>
+    </p:extLst>
+  </p:cSld>
+  <p:clrMapOvr>
+    <a:masterClrMapping/>
+  </p:clrMapOvr>
+</p:sld>
+</file>
+
+<file path=ppt/slides/slide12.xml><?xml version="1.0" encoding="utf-8"?>
+<p:sld xmlns:a="http://schemas.openxmlformats.org/drawingml/2006/main" xmlns:r="http://schemas.openxmlformats.org/officeDocument/2006/relationships" xmlns:p="http://schemas.openxmlformats.org/presentationml/2006/main">
+  <p:cSld>
+    <p:spTree>
+      <p:nvGrpSpPr>
+        <p:cNvPr id="1" name=""/>
+        <p:cNvGrpSpPr/>
+        <p:nvPr/>
+      </p:nvGrpSpPr>
+      <p:grpSpPr>
+        <a:xfrm>
+          <a:off x="0" y="0"/>
+          <a:ext cx="0" cy="0"/>
+          <a:chOff x="0" y="0"/>
+          <a:chExt cx="0" cy="0"/>
+        </a:xfrm>
+      </p:grpSpPr>
+      <p:sp>
+        <p:nvSpPr>
+          <p:cNvPr id="2" name="Tytuł 1">
+            <a:extLst>
+              <a:ext uri="{FF2B5EF4-FFF2-40B4-BE49-F238E27FC236}">
+                <a16:creationId xmlns:a16="http://schemas.microsoft.com/office/drawing/2014/main" id="{846B20A1-DF77-49E9-9FC9-D8D9FFADA71B}"/>
+              </a:ext>
+            </a:extLst>
+          </p:cNvPr>
+          <p:cNvSpPr>
+            <a:spLocks noGrp="1"/>
+          </p:cNvSpPr>
+          <p:nvPr>
+            <p:ph type="title"/>
+          </p:nvPr>
+        </p:nvSpPr>
+        <p:spPr/>
+        <p:txBody>
+          <a:bodyPr/>
+          <a:lstStyle/>
+          <a:p>
+            <a:r>
+              <a:rPr lang="pl-PL" dirty="0">
+                <a:solidFill>
+                  <a:schemeClr val="accent1">
+                    <a:lumMod val="75000"/>
+                  </a:schemeClr>
+                </a:solidFill>
+              </a:rPr>
+              <a:t>Wind </a:t>
+            </a:r>
+            <a:r>
+              <a:rPr lang="pl-PL" dirty="0" err="1">
+                <a:solidFill>
+                  <a:schemeClr val="accent1">
+                    <a:lumMod val="75000"/>
+                  </a:schemeClr>
+                </a:solidFill>
+              </a:rPr>
+              <a:t>analysis</a:t>
+            </a:r>
+            <a:endParaRPr lang="pl-PL" dirty="0">
+              <a:solidFill>
+                <a:schemeClr val="accent1">
+                  <a:lumMod val="75000"/>
+                </a:schemeClr>
+              </a:solidFill>
+            </a:endParaRPr>
+          </a:p>
+        </p:txBody>
+      </p:sp>
+      <p:pic>
+        <p:nvPicPr>
+          <p:cNvPr id="9" name="Symbol zastępczy zawartości 8">
+            <a:extLst>
+              <a:ext uri="{FF2B5EF4-FFF2-40B4-BE49-F238E27FC236}">
+                <a16:creationId xmlns:a16="http://schemas.microsoft.com/office/drawing/2014/main" id="{85F017C7-2F8D-1537-D06C-A8AF2FA60252}"/>
+              </a:ext>
+            </a:extLst>
+          </p:cNvPr>
+          <p:cNvPicPr>
+            <a:picLocks noGrp="1" noChangeAspect="1"/>
+          </p:cNvPicPr>
+          <p:nvPr>
+            <p:ph sz="half" idx="1"/>
+          </p:nvPr>
+        </p:nvPicPr>
+        <p:blipFill>
+          <a:blip r:embed="rId2">
+            <a:extLst>
+              <a:ext uri="{28A0092B-C50C-407E-A947-70E740481C1C}">
+                <a14:useLocalDpi xmlns:a14="http://schemas.microsoft.com/office/drawing/2010/main" val="0"/>
+              </a:ext>
+            </a:extLst>
+          </a:blip>
+          <a:stretch>
+            <a:fillRect/>
+          </a:stretch>
+        </p:blipFill>
+        <p:spPr>
+          <a:xfrm>
+            <a:off x="1413559" y="1727944"/>
+            <a:ext cx="4065065" cy="4351338"/>
+          </a:xfrm>
+        </p:spPr>
+      </p:pic>
+      <p:pic>
+        <p:nvPicPr>
+          <p:cNvPr id="12" name="Symbol zastępczy zawartości 11" descr="Obraz zawierający tekst, naczynie, sushi, zupa&#10;&#10;Opis wygenerowany automatycznie">
+            <a:extLst>
+              <a:ext uri="{FF2B5EF4-FFF2-40B4-BE49-F238E27FC236}">
+                <a16:creationId xmlns:a16="http://schemas.microsoft.com/office/drawing/2014/main" id="{F0CF628A-BC36-C5DF-ECA1-24798D8ABC66}"/>
+              </a:ext>
+            </a:extLst>
+          </p:cNvPr>
+          <p:cNvPicPr>
+            <a:picLocks noGrp="1" noChangeAspect="1"/>
+          </p:cNvPicPr>
+          <p:nvPr>
+            <p:ph sz="half" idx="2"/>
+          </p:nvPr>
+        </p:nvPicPr>
+        <p:blipFill>
+          <a:blip r:embed="rId3">
+            <a:extLst>
+              <a:ext uri="{28A0092B-C50C-407E-A947-70E740481C1C}">
+                <a14:useLocalDpi xmlns:a14="http://schemas.microsoft.com/office/drawing/2010/main" val="0"/>
+              </a:ext>
+            </a:extLst>
+          </a:blip>
+          <a:stretch>
+            <a:fillRect/>
+          </a:stretch>
+        </p:blipFill>
+        <p:spPr>
+          <a:xfrm>
+            <a:off x="6172200" y="2128553"/>
+            <a:ext cx="5181600" cy="3745481"/>
+          </a:xfrm>
+        </p:spPr>
+      </p:pic>
+      <p:cxnSp>
+        <p:nvCxnSpPr>
+          <p:cNvPr id="5" name="Łącznik prosty 4">
+            <a:extLst>
+              <a:ext uri="{FF2B5EF4-FFF2-40B4-BE49-F238E27FC236}">
+                <a16:creationId xmlns:a16="http://schemas.microsoft.com/office/drawing/2014/main" id="{3B41ED5C-B54D-4CD7-BD3A-74F3EBB43590}"/>
+              </a:ext>
+            </a:extLst>
+          </p:cNvPr>
+          <p:cNvCxnSpPr/>
+          <p:nvPr/>
+        </p:nvCxnSpPr>
+        <p:spPr>
+          <a:xfrm>
+            <a:off x="0" y="1434517"/>
+            <a:ext cx="12192000" cy="0"/>
+          </a:xfrm>
+          <a:prstGeom prst="line">
+            <a:avLst/>
+          </a:prstGeom>
+          <a:ln w="38100">
+            <a:solidFill>
+              <a:schemeClr val="accent1">
+                <a:lumMod val="75000"/>
+              </a:schemeClr>
+            </a:solidFill>
+          </a:ln>
+        </p:spPr>
+        <p:style>
+          <a:lnRef idx="1">
+            <a:schemeClr val="accent1"/>
+          </a:lnRef>
+          <a:fillRef idx="0">
+            <a:schemeClr val="accent1"/>
+          </a:fillRef>
+          <a:effectRef idx="0">
+            <a:schemeClr val="accent1"/>
+          </a:effectRef>
+          <a:fontRef idx="minor">
+            <a:schemeClr val="tx1"/>
+          </a:fontRef>
+        </p:style>
+      </p:cxnSp>
+    </p:spTree>
+    <p:extLst>
+      <p:ext uri="{BB962C8B-B14F-4D97-AF65-F5344CB8AC3E}">
+        <p14:creationId xmlns:p14="http://schemas.microsoft.com/office/powerpoint/2010/main" val="940599189"/>
+      </p:ext>
+    </p:extLst>
+  </p:cSld>
+  <p:clrMapOvr>
+    <a:masterClrMapping/>
+  </p:clrMapOvr>
+</p:sld>
+</file>
+
+<file path=ppt/slides/slide13.xml><?xml version="1.0" encoding="utf-8"?>
+<p:sld xmlns:a="http://schemas.openxmlformats.org/drawingml/2006/main" xmlns:r="http://schemas.openxmlformats.org/officeDocument/2006/relationships" xmlns:p="http://schemas.openxmlformats.org/presentationml/2006/main">
+  <p:cSld>
+    <p:spTree>
+      <p:nvGrpSpPr>
+        <p:cNvPr id="1" name=""/>
+        <p:cNvGrpSpPr/>
+        <p:nvPr/>
+      </p:nvGrpSpPr>
+      <p:grpSpPr>
+        <a:xfrm>
+          <a:off x="0" y="0"/>
+          <a:ext cx="0" cy="0"/>
+          <a:chOff x="0" y="0"/>
+          <a:chExt cx="0" cy="0"/>
+        </a:xfrm>
+      </p:grpSpPr>
+      <p:sp>
+        <p:nvSpPr>
+          <p:cNvPr id="2" name="Tytuł 1">
+            <a:extLst>
+              <a:ext uri="{FF2B5EF4-FFF2-40B4-BE49-F238E27FC236}">
+                <a16:creationId xmlns:a16="http://schemas.microsoft.com/office/drawing/2014/main" id="{846B20A1-DF77-49E9-9FC9-D8D9FFADA71B}"/>
+              </a:ext>
+            </a:extLst>
+          </p:cNvPr>
+          <p:cNvSpPr>
+            <a:spLocks noGrp="1"/>
+          </p:cNvSpPr>
+          <p:nvPr>
+            <p:ph type="title"/>
+          </p:nvPr>
+        </p:nvSpPr>
+        <p:spPr/>
+        <p:txBody>
+          <a:bodyPr/>
+          <a:lstStyle/>
+          <a:p>
+            <a:r>
+              <a:rPr lang="pl-PL" dirty="0">
+                <a:solidFill>
+                  <a:schemeClr val="accent1">
+                    <a:lumMod val="75000"/>
+                  </a:schemeClr>
+                </a:solidFill>
+              </a:rPr>
+              <a:t>Wind </a:t>
+            </a:r>
+            <a:r>
+              <a:rPr lang="pl-PL" dirty="0" err="1">
+                <a:solidFill>
+                  <a:schemeClr val="accent1">
+                    <a:lumMod val="75000"/>
+                  </a:schemeClr>
+                </a:solidFill>
+              </a:rPr>
+              <a:t>analysis</a:t>
+            </a:r>
+            <a:endParaRPr lang="pl-PL" dirty="0">
+              <a:solidFill>
+                <a:schemeClr val="accent1">
+                  <a:lumMod val="75000"/>
+                </a:schemeClr>
+              </a:solidFill>
+            </a:endParaRPr>
+          </a:p>
+        </p:txBody>
+      </p:sp>
+      <p:pic>
+        <p:nvPicPr>
+          <p:cNvPr id="9" name="Symbol zastępczy zawartości 8">
+            <a:extLst>
+              <a:ext uri="{FF2B5EF4-FFF2-40B4-BE49-F238E27FC236}">
+                <a16:creationId xmlns:a16="http://schemas.microsoft.com/office/drawing/2014/main" id="{CEC1C9DB-CBC0-F5DD-D6C9-2249D958A801}"/>
+              </a:ext>
+            </a:extLst>
+          </p:cNvPr>
+          <p:cNvPicPr>
+            <a:picLocks noGrp="1" noChangeAspect="1"/>
+          </p:cNvPicPr>
+          <p:nvPr>
+            <p:ph sz="half" idx="1"/>
+          </p:nvPr>
+        </p:nvPicPr>
+        <p:blipFill>
+          <a:blip r:embed="rId2">
+            <a:extLst>
+              <a:ext uri="{28A0092B-C50C-407E-A947-70E740481C1C}">
+                <a14:useLocalDpi xmlns:a14="http://schemas.microsoft.com/office/drawing/2010/main" val="0"/>
+              </a:ext>
+            </a:extLst>
+          </a:blip>
+          <a:stretch>
+            <a:fillRect/>
+          </a:stretch>
+        </p:blipFill>
+        <p:spPr>
+          <a:xfrm>
+            <a:off x="1091667" y="2426135"/>
+            <a:ext cx="4674665" cy="3150318"/>
+          </a:xfrm>
+        </p:spPr>
+      </p:pic>
+      <p:pic>
+        <p:nvPicPr>
+          <p:cNvPr id="12" name="Symbol zastępczy zawartości 11">
+            <a:extLst>
+              <a:ext uri="{FF2B5EF4-FFF2-40B4-BE49-F238E27FC236}">
+                <a16:creationId xmlns:a16="http://schemas.microsoft.com/office/drawing/2014/main" id="{E0C8C810-D016-C08D-30C7-205B9B6CB853}"/>
+              </a:ext>
+            </a:extLst>
+          </p:cNvPr>
+          <p:cNvPicPr>
+            <a:picLocks noGrp="1" noChangeAspect="1"/>
+          </p:cNvPicPr>
+          <p:nvPr>
+            <p:ph sz="half" idx="2"/>
+          </p:nvPr>
+        </p:nvPicPr>
+        <p:blipFill>
+          <a:blip r:embed="rId3">
+            <a:extLst>
+              <a:ext uri="{28A0092B-C50C-407E-A947-70E740481C1C}">
+                <a14:useLocalDpi xmlns:a14="http://schemas.microsoft.com/office/drawing/2010/main" val="0"/>
+              </a:ext>
+            </a:extLst>
+          </a:blip>
+          <a:stretch>
+            <a:fillRect/>
+          </a:stretch>
+        </p:blipFill>
+        <p:spPr>
+          <a:xfrm>
+            <a:off x="6607146" y="1825625"/>
+            <a:ext cx="4311708" cy="4351338"/>
+          </a:xfrm>
+        </p:spPr>
+      </p:pic>
+      <p:cxnSp>
+        <p:nvCxnSpPr>
+          <p:cNvPr id="5" name="Łącznik prosty 4">
+            <a:extLst>
+              <a:ext uri="{FF2B5EF4-FFF2-40B4-BE49-F238E27FC236}">
+                <a16:creationId xmlns:a16="http://schemas.microsoft.com/office/drawing/2014/main" id="{3B41ED5C-B54D-4CD7-BD3A-74F3EBB43590}"/>
+              </a:ext>
+            </a:extLst>
+          </p:cNvPr>
+          <p:cNvCxnSpPr/>
+          <p:nvPr/>
+        </p:nvCxnSpPr>
+        <p:spPr>
+          <a:xfrm>
+            <a:off x="0" y="1434517"/>
+            <a:ext cx="12192000" cy="0"/>
+          </a:xfrm>
+          <a:prstGeom prst="line">
+            <a:avLst/>
+          </a:prstGeom>
+          <a:ln w="38100">
+            <a:solidFill>
+              <a:schemeClr val="accent1">
+                <a:lumMod val="75000"/>
+              </a:schemeClr>
+            </a:solidFill>
+          </a:ln>
+        </p:spPr>
+        <p:style>
+          <a:lnRef idx="1">
+            <a:schemeClr val="accent1"/>
+          </a:lnRef>
+          <a:fillRef idx="0">
+            <a:schemeClr val="accent1"/>
+          </a:fillRef>
+          <a:effectRef idx="0">
+            <a:schemeClr val="accent1"/>
+          </a:effectRef>
+          <a:fontRef idx="minor">
+            <a:schemeClr val="tx1"/>
+          </a:fontRef>
+        </p:style>
+      </p:cxnSp>
+    </p:spTree>
+    <p:extLst>
+      <p:ext uri="{BB962C8B-B14F-4D97-AF65-F5344CB8AC3E}">
+        <p14:creationId xmlns:p14="http://schemas.microsoft.com/office/powerpoint/2010/main" val="2498814593"/>
+      </p:ext>
+    </p:extLst>
+  </p:cSld>
+  <p:clrMapOvr>
+    <a:masterClrMapping/>
+  </p:clrMapOvr>
+</p:sld>
+</file>
+
+<file path=ppt/slides/slide14.xml><?xml version="1.0" encoding="utf-8"?>
+<p:sld xmlns:a="http://schemas.openxmlformats.org/drawingml/2006/main" xmlns:r="http://schemas.openxmlformats.org/officeDocument/2006/relationships" xmlns:p="http://schemas.openxmlformats.org/presentationml/2006/main">
+  <p:cSld>
+    <p:spTree>
+      <p:nvGrpSpPr>
+        <p:cNvPr id="1" name=""/>
+        <p:cNvGrpSpPr/>
+        <p:nvPr/>
+      </p:nvGrpSpPr>
+      <p:grpSpPr>
+        <a:xfrm>
+          <a:off x="0" y="0"/>
+          <a:ext cx="0" cy="0"/>
+          <a:chOff x="0" y="0"/>
+          <a:chExt cx="0" cy="0"/>
+        </a:xfrm>
+      </p:grpSpPr>
+      <p:sp>
+        <p:nvSpPr>
+          <p:cNvPr id="2" name="Tytuł 1">
+            <a:extLst>
+              <a:ext uri="{FF2B5EF4-FFF2-40B4-BE49-F238E27FC236}">
+                <a16:creationId xmlns:a16="http://schemas.microsoft.com/office/drawing/2014/main" id="{846B20A1-DF77-49E9-9FC9-D8D9FFADA71B}"/>
+              </a:ext>
+            </a:extLst>
+          </p:cNvPr>
+          <p:cNvSpPr>
+            <a:spLocks noGrp="1"/>
+          </p:cNvSpPr>
+          <p:nvPr>
+            <p:ph type="title"/>
+          </p:nvPr>
+        </p:nvSpPr>
+        <p:spPr/>
+        <p:txBody>
+          <a:bodyPr/>
+          <a:lstStyle/>
+          <a:p>
+            <a:r>
+              <a:rPr lang="pl-PL" dirty="0">
+                <a:solidFill>
+                  <a:schemeClr val="accent1">
+                    <a:lumMod val="75000"/>
+                  </a:schemeClr>
+                </a:solidFill>
+              </a:rPr>
+              <a:t>„</a:t>
+            </a:r>
+            <a:r>
+              <a:rPr lang="pl-PL" dirty="0" err="1">
+                <a:solidFill>
+                  <a:schemeClr val="accent1">
+                    <a:lumMod val="75000"/>
+                  </a:schemeClr>
+                </a:solidFill>
+              </a:rPr>
+              <a:t>ssrd</a:t>
+            </a:r>
+            <a:r>
+              <a:rPr lang="pl-PL" dirty="0">
+                <a:solidFill>
+                  <a:schemeClr val="accent1">
+                    <a:lumMod val="75000"/>
+                  </a:schemeClr>
+                </a:solidFill>
+              </a:rPr>
+              <a:t>” vs </a:t>
+            </a:r>
+            <a:r>
+              <a:rPr lang="pl-PL" dirty="0" err="1">
+                <a:solidFill>
+                  <a:schemeClr val="accent1">
+                    <a:lumMod val="75000"/>
+                  </a:schemeClr>
+                </a:solidFill>
+              </a:rPr>
+              <a:t>clear_sky</a:t>
+            </a:r>
+            <a:endParaRPr lang="pl-PL" dirty="0">
+              <a:solidFill>
+                <a:schemeClr val="accent1">
+                  <a:lumMod val="75000"/>
+                </a:schemeClr>
+              </a:solidFill>
+            </a:endParaRPr>
+          </a:p>
+        </p:txBody>
+      </p:sp>
+      <p:cxnSp>
+        <p:nvCxnSpPr>
+          <p:cNvPr id="5" name="Łącznik prosty 4">
+            <a:extLst>
+              <a:ext uri="{FF2B5EF4-FFF2-40B4-BE49-F238E27FC236}">
+                <a16:creationId xmlns:a16="http://schemas.microsoft.com/office/drawing/2014/main" id="{3B41ED5C-B54D-4CD7-BD3A-74F3EBB43590}"/>
+              </a:ext>
+            </a:extLst>
+          </p:cNvPr>
+          <p:cNvCxnSpPr/>
+          <p:nvPr/>
+        </p:nvCxnSpPr>
+        <p:spPr>
+          <a:xfrm>
+            <a:off x="0" y="1434517"/>
+            <a:ext cx="12192000" cy="0"/>
+          </a:xfrm>
+          <a:prstGeom prst="line">
+            <a:avLst/>
+          </a:prstGeom>
+          <a:ln w="38100">
+            <a:solidFill>
+              <a:schemeClr val="accent1">
+                <a:lumMod val="75000"/>
+              </a:schemeClr>
+            </a:solidFill>
+          </a:ln>
+        </p:spPr>
+        <p:style>
+          <a:lnRef idx="1">
+            <a:schemeClr val="accent1"/>
+          </a:lnRef>
+          <a:fillRef idx="0">
+            <a:schemeClr val="accent1"/>
+          </a:fillRef>
+          <a:effectRef idx="0">
+            <a:schemeClr val="accent1"/>
+          </a:effectRef>
+          <a:fontRef idx="minor">
+            <a:schemeClr val="tx1"/>
+          </a:fontRef>
+        </p:style>
+      </p:cxnSp>
+      <p:pic>
+        <p:nvPicPr>
+          <p:cNvPr id="17" name="Symbol zastępczy zawartości 16">
+            <a:extLst>
+              <a:ext uri="{FF2B5EF4-FFF2-40B4-BE49-F238E27FC236}">
+                <a16:creationId xmlns:a16="http://schemas.microsoft.com/office/drawing/2014/main" id="{E4B7F673-237B-98DC-1A3D-7DE4827A1060}"/>
+              </a:ext>
+            </a:extLst>
+          </p:cNvPr>
+          <p:cNvPicPr>
+            <a:picLocks noGrp="1" noChangeAspect="1"/>
+          </p:cNvPicPr>
+          <p:nvPr>
+            <p:ph sz="half" idx="2"/>
+          </p:nvPr>
+        </p:nvPicPr>
+        <p:blipFill>
+          <a:blip r:embed="rId2">
+            <a:extLst>
+              <a:ext uri="{28A0092B-C50C-407E-A947-70E740481C1C}">
+                <a14:useLocalDpi xmlns:a14="http://schemas.microsoft.com/office/drawing/2010/main" val="0"/>
+              </a:ext>
+            </a:extLst>
+          </a:blip>
+          <a:stretch>
+            <a:fillRect/>
+          </a:stretch>
+        </p:blipFill>
+        <p:spPr>
+          <a:xfrm>
+            <a:off x="6172200" y="2657131"/>
+            <a:ext cx="5181600" cy="2688325"/>
+          </a:xfrm>
+        </p:spPr>
+      </p:pic>
+      <p:pic>
+        <p:nvPicPr>
+          <p:cNvPr id="15" name="Symbol zastępczy zawartości 14">
+            <a:extLst>
+              <a:ext uri="{FF2B5EF4-FFF2-40B4-BE49-F238E27FC236}">
+                <a16:creationId xmlns:a16="http://schemas.microsoft.com/office/drawing/2014/main" id="{921C6AD2-C201-BA0C-C79C-6379C3C40323}"/>
+              </a:ext>
+            </a:extLst>
+          </p:cNvPr>
+          <p:cNvPicPr>
+            <a:picLocks noGrp="1" noChangeAspect="1"/>
+          </p:cNvPicPr>
+          <p:nvPr>
+            <p:ph sz="half" idx="1"/>
+          </p:nvPr>
+        </p:nvPicPr>
+        <p:blipFill>
+          <a:blip r:embed="rId3">
+            <a:extLst>
+              <a:ext uri="{28A0092B-C50C-407E-A947-70E740481C1C}">
+                <a14:useLocalDpi xmlns:a14="http://schemas.microsoft.com/office/drawing/2010/main" val="0"/>
+              </a:ext>
+            </a:extLst>
+          </a:blip>
+          <a:stretch>
+            <a:fillRect/>
+          </a:stretch>
+        </p:blipFill>
+        <p:spPr>
+          <a:xfrm>
+            <a:off x="1066261" y="2426135"/>
+            <a:ext cx="4725477" cy="3150318"/>
+          </a:xfrm>
+        </p:spPr>
+      </p:pic>
+    </p:spTree>
+    <p:extLst>
+      <p:ext uri="{BB962C8B-B14F-4D97-AF65-F5344CB8AC3E}">
+        <p14:creationId xmlns:p14="http://schemas.microsoft.com/office/powerpoint/2010/main" val="1834082441"/>
+      </p:ext>
+    </p:extLst>
+  </p:cSld>
+  <p:clrMapOvr>
+    <a:masterClrMapping/>
+  </p:clrMapOvr>
+</p:sld>
+</file>
+
+<file path=ppt/slides/slide15.xml><?xml version="1.0" encoding="utf-8"?>
+<p:sld xmlns:a="http://schemas.openxmlformats.org/drawingml/2006/main" xmlns:r="http://schemas.openxmlformats.org/officeDocument/2006/relationships" xmlns:p="http://schemas.openxmlformats.org/presentationml/2006/main">
+  <p:cSld>
+    <p:spTree>
+      <p:nvGrpSpPr>
+        <p:cNvPr id="1" name=""/>
+        <p:cNvGrpSpPr/>
+        <p:nvPr/>
+      </p:nvGrpSpPr>
+      <p:grpSpPr>
+        <a:xfrm>
+          <a:off x="0" y="0"/>
+          <a:ext cx="0" cy="0"/>
+          <a:chOff x="0" y="0"/>
+          <a:chExt cx="0" cy="0"/>
+        </a:xfrm>
+      </p:grpSpPr>
+      <p:sp>
+        <p:nvSpPr>
+          <p:cNvPr id="2" name="Tytuł 1">
+            <a:extLst>
+              <a:ext uri="{FF2B5EF4-FFF2-40B4-BE49-F238E27FC236}">
+                <a16:creationId xmlns:a16="http://schemas.microsoft.com/office/drawing/2014/main" id="{846B20A1-DF77-49E9-9FC9-D8D9FFADA71B}"/>
+              </a:ext>
+            </a:extLst>
+          </p:cNvPr>
+          <p:cNvSpPr>
+            <a:spLocks noGrp="1"/>
+          </p:cNvSpPr>
+          <p:nvPr>
+            <p:ph type="title"/>
+          </p:nvPr>
+        </p:nvSpPr>
+        <p:spPr/>
+        <p:txBody>
+          <a:bodyPr/>
+          <a:lstStyle/>
+          <a:p>
+            <a:r>
+              <a:rPr lang="pl-PL" dirty="0" err="1">
+                <a:solidFill>
+                  <a:schemeClr val="accent1">
+                    <a:lumMod val="75000"/>
+                  </a:schemeClr>
+                </a:solidFill>
+              </a:rPr>
+              <a:t>Dense</a:t>
+            </a:r>
+            <a:r>
+              <a:rPr lang="pl-PL" dirty="0">
+                <a:solidFill>
+                  <a:schemeClr val="accent1">
+                    <a:lumMod val="75000"/>
+                  </a:schemeClr>
+                </a:solidFill>
+              </a:rPr>
+              <a:t> model</a:t>
+            </a:r>
+          </a:p>
+        </p:txBody>
+      </p:sp>
+      <p:cxnSp>
+        <p:nvCxnSpPr>
+          <p:cNvPr id="5" name="Łącznik prosty 4">
+            <a:extLst>
+              <a:ext uri="{FF2B5EF4-FFF2-40B4-BE49-F238E27FC236}">
+                <a16:creationId xmlns:a16="http://schemas.microsoft.com/office/drawing/2014/main" id="{3B41ED5C-B54D-4CD7-BD3A-74F3EBB43590}"/>
+              </a:ext>
+            </a:extLst>
+          </p:cNvPr>
+          <p:cNvCxnSpPr/>
+          <p:nvPr/>
+        </p:nvCxnSpPr>
+        <p:spPr>
+          <a:xfrm>
+            <a:off x="0" y="1434517"/>
+            <a:ext cx="12192000" cy="0"/>
+          </a:xfrm>
+          <a:prstGeom prst="line">
+            <a:avLst/>
+          </a:prstGeom>
+          <a:ln w="38100">
+            <a:solidFill>
+              <a:schemeClr val="accent1">
+                <a:lumMod val="75000"/>
+              </a:schemeClr>
+            </a:solidFill>
+          </a:ln>
+        </p:spPr>
+        <p:style>
+          <a:lnRef idx="1">
+            <a:schemeClr val="accent1"/>
+          </a:lnRef>
+          <a:fillRef idx="0">
+            <a:schemeClr val="accent1"/>
+          </a:fillRef>
+          <a:effectRef idx="0">
+            <a:schemeClr val="accent1"/>
+          </a:effectRef>
+          <a:fontRef idx="minor">
+            <a:schemeClr val="tx1"/>
+          </a:fontRef>
+        </p:style>
+      </p:cxnSp>
+      <p:pic>
+        <p:nvPicPr>
+          <p:cNvPr id="9" name="Symbol zastępczy zawartości 8">
+            <a:extLst>
+              <a:ext uri="{FF2B5EF4-FFF2-40B4-BE49-F238E27FC236}">
+                <a16:creationId xmlns:a16="http://schemas.microsoft.com/office/drawing/2014/main" id="{B95A272F-972C-010A-D18F-BDBE86F1A48A}"/>
+              </a:ext>
+            </a:extLst>
+          </p:cNvPr>
+          <p:cNvPicPr>
+            <a:picLocks noGrp="1" noChangeAspect="1"/>
+          </p:cNvPicPr>
+          <p:nvPr>
+            <p:ph sz="half" idx="1"/>
+          </p:nvPr>
+        </p:nvPicPr>
+        <p:blipFill>
+          <a:blip r:embed="rId2">
+            <a:extLst>
+              <a:ext uri="{28A0092B-C50C-407E-A947-70E740481C1C}">
+                <a14:useLocalDpi xmlns:a14="http://schemas.microsoft.com/office/drawing/2010/main" val="0"/>
+              </a:ext>
+            </a:extLst>
+          </a:blip>
+          <a:stretch>
+            <a:fillRect/>
+          </a:stretch>
+        </p:blipFill>
+        <p:spPr>
+          <a:xfrm>
+            <a:off x="838200" y="2701795"/>
+            <a:ext cx="5181600" cy="2598998"/>
+          </a:xfrm>
+        </p:spPr>
+      </p:pic>
+      <p:pic>
+        <p:nvPicPr>
+          <p:cNvPr id="11" name="Symbol zastępczy zawartości 10">
+            <a:extLst>
+              <a:ext uri="{FF2B5EF4-FFF2-40B4-BE49-F238E27FC236}">
+                <a16:creationId xmlns:a16="http://schemas.microsoft.com/office/drawing/2014/main" id="{61EFB272-F82B-B760-74DC-52F3AF303723}"/>
+              </a:ext>
+            </a:extLst>
+          </p:cNvPr>
+          <p:cNvPicPr>
+            <a:picLocks noGrp="1" noChangeAspect="1"/>
+          </p:cNvPicPr>
+          <p:nvPr>
+            <p:ph sz="half" idx="2"/>
+          </p:nvPr>
+        </p:nvPicPr>
+        <p:blipFill>
+          <a:blip r:embed="rId3">
+            <a:extLst>
+              <a:ext uri="{28A0092B-C50C-407E-A947-70E740481C1C}">
+                <a14:useLocalDpi xmlns:a14="http://schemas.microsoft.com/office/drawing/2010/main" val="0"/>
+              </a:ext>
+            </a:extLst>
+          </a:blip>
+          <a:stretch>
+            <a:fillRect/>
+          </a:stretch>
+        </p:blipFill>
+        <p:spPr>
+          <a:xfrm>
+            <a:off x="6172200" y="2626144"/>
+            <a:ext cx="5181600" cy="2750300"/>
+          </a:xfrm>
+        </p:spPr>
+      </p:pic>
+      <p:sp>
+        <p:nvSpPr>
+          <p:cNvPr id="12" name="pole tekstowe 11">
+            <a:extLst>
+              <a:ext uri="{FF2B5EF4-FFF2-40B4-BE49-F238E27FC236}">
+                <a16:creationId xmlns:a16="http://schemas.microsoft.com/office/drawing/2014/main" id="{9BFED435-88C6-726D-B1A8-B6BCE4DD0EF2}"/>
+              </a:ext>
+            </a:extLst>
+          </p:cNvPr>
+          <p:cNvSpPr txBox="1"/>
+          <p:nvPr/>
+        </p:nvSpPr>
+        <p:spPr>
+          <a:xfrm>
+            <a:off x="2329872" y="1875354"/>
+            <a:ext cx="2198255" cy="369332"/>
+          </a:xfrm>
+          <a:prstGeom prst="rect">
+            <a:avLst/>
+          </a:prstGeom>
+          <a:noFill/>
+        </p:spPr>
+        <p:txBody>
+          <a:bodyPr wrap="square" rtlCol="0">
+            <a:spAutoFit/>
+          </a:bodyPr>
+          <a:lstStyle/>
+          <a:p>
+            <a:pPr algn="just"/>
+            <a:r>
+              <a:rPr lang="pl-PL" dirty="0"/>
+              <a:t>RMSE = 0.0980</a:t>
+            </a:r>
+            <a:endParaRPr lang="en-GB" dirty="0"/>
+          </a:p>
+        </p:txBody>
+      </p:sp>
+    </p:spTree>
+    <p:extLst>
+      <p:ext uri="{BB962C8B-B14F-4D97-AF65-F5344CB8AC3E}">
+        <p14:creationId xmlns:p14="http://schemas.microsoft.com/office/powerpoint/2010/main" val="3105234533"/>
+      </p:ext>
+    </p:extLst>
+  </p:cSld>
+  <p:clrMapOvr>
+    <a:masterClrMapping/>
+  </p:clrMapOvr>
+</p:sld>
+</file>
+
+<file path=ppt/slides/slide16.xml><?xml version="1.0" encoding="utf-8"?>
+<p:sld xmlns:a="http://schemas.openxmlformats.org/drawingml/2006/main" xmlns:r="http://schemas.openxmlformats.org/officeDocument/2006/relationships" xmlns:p="http://schemas.openxmlformats.org/presentationml/2006/main">
+  <p:cSld>
+    <p:spTree>
+      <p:nvGrpSpPr>
+        <p:cNvPr id="1" name=""/>
+        <p:cNvGrpSpPr/>
+        <p:nvPr/>
+      </p:nvGrpSpPr>
+      <p:grpSpPr>
+        <a:xfrm>
+          <a:off x="0" y="0"/>
+          <a:ext cx="0" cy="0"/>
+          <a:chOff x="0" y="0"/>
+          <a:chExt cx="0" cy="0"/>
+        </a:xfrm>
+      </p:grpSpPr>
+      <p:sp>
+        <p:nvSpPr>
+          <p:cNvPr id="2" name="Tytuł 1">
+            <a:extLst>
+              <a:ext uri="{FF2B5EF4-FFF2-40B4-BE49-F238E27FC236}">
+                <a16:creationId xmlns:a16="http://schemas.microsoft.com/office/drawing/2014/main" id="{846B20A1-DF77-49E9-9FC9-D8D9FFADA71B}"/>
+              </a:ext>
+            </a:extLst>
+          </p:cNvPr>
+          <p:cNvSpPr>
+            <a:spLocks noGrp="1"/>
+          </p:cNvSpPr>
+          <p:nvPr>
+            <p:ph type="title"/>
+          </p:nvPr>
+        </p:nvSpPr>
+        <p:spPr/>
+        <p:txBody>
+          <a:bodyPr/>
+          <a:lstStyle/>
+          <a:p>
+            <a:r>
+              <a:rPr lang="pl-PL" dirty="0">
+                <a:solidFill>
+                  <a:schemeClr val="accent1">
+                    <a:lumMod val="75000"/>
+                  </a:schemeClr>
+                </a:solidFill>
+              </a:rPr>
+              <a:t>LSTM model</a:t>
+            </a:r>
+          </a:p>
+        </p:txBody>
+      </p:sp>
+      <p:cxnSp>
+        <p:nvCxnSpPr>
+          <p:cNvPr id="5" name="Łącznik prosty 4">
+            <a:extLst>
+              <a:ext uri="{FF2B5EF4-FFF2-40B4-BE49-F238E27FC236}">
+                <a16:creationId xmlns:a16="http://schemas.microsoft.com/office/drawing/2014/main" id="{3B41ED5C-B54D-4CD7-BD3A-74F3EBB43590}"/>
+              </a:ext>
+            </a:extLst>
+          </p:cNvPr>
+          <p:cNvCxnSpPr/>
+          <p:nvPr/>
+        </p:nvCxnSpPr>
+        <p:spPr>
+          <a:xfrm>
+            <a:off x="0" y="1434517"/>
+            <a:ext cx="12192000" cy="0"/>
+          </a:xfrm>
+          <a:prstGeom prst="line">
+            <a:avLst/>
+          </a:prstGeom>
+          <a:ln w="38100">
+            <a:solidFill>
+              <a:schemeClr val="accent1">
+                <a:lumMod val="75000"/>
+              </a:schemeClr>
+            </a:solidFill>
+          </a:ln>
+        </p:spPr>
+        <p:style>
+          <a:lnRef idx="1">
+            <a:schemeClr val="accent1"/>
+          </a:lnRef>
+          <a:fillRef idx="0">
+            <a:schemeClr val="accent1"/>
+          </a:fillRef>
+          <a:effectRef idx="0">
+            <a:schemeClr val="accent1"/>
+          </a:effectRef>
+          <a:fontRef idx="minor">
+            <a:schemeClr val="tx1"/>
+          </a:fontRef>
+        </p:style>
+      </p:cxnSp>
+      <p:pic>
+        <p:nvPicPr>
+          <p:cNvPr id="10" name="Symbol zastępczy zawartości 9" descr="Obraz zawierający tekst, ściana, różny&#10;&#10;Opis wygenerowany automatycznie">
+            <a:extLst>
+              <a:ext uri="{FF2B5EF4-FFF2-40B4-BE49-F238E27FC236}">
+                <a16:creationId xmlns:a16="http://schemas.microsoft.com/office/drawing/2014/main" id="{0AD5C426-478A-8773-C456-209D87443583}"/>
+              </a:ext>
+            </a:extLst>
+          </p:cNvPr>
+          <p:cNvPicPr>
+            <a:picLocks noGrp="1" noChangeAspect="1"/>
+          </p:cNvPicPr>
+          <p:nvPr>
+            <p:ph sz="half" idx="1"/>
+          </p:nvPr>
+        </p:nvPicPr>
+        <p:blipFill>
+          <a:blip r:embed="rId2">
+            <a:extLst>
+              <a:ext uri="{28A0092B-C50C-407E-A947-70E740481C1C}">
+                <a14:useLocalDpi xmlns:a14="http://schemas.microsoft.com/office/drawing/2010/main" val="0"/>
+              </a:ext>
+            </a:extLst>
+          </a:blip>
+          <a:stretch>
+            <a:fillRect/>
+          </a:stretch>
+        </p:blipFill>
+        <p:spPr>
+          <a:xfrm>
+            <a:off x="838200" y="2701795"/>
+            <a:ext cx="5181600" cy="2598998"/>
+          </a:xfrm>
+        </p:spPr>
+      </p:pic>
+      <p:pic>
+        <p:nvPicPr>
+          <p:cNvPr id="13" name="Symbol zastępczy zawartości 12">
+            <a:extLst>
+              <a:ext uri="{FF2B5EF4-FFF2-40B4-BE49-F238E27FC236}">
+                <a16:creationId xmlns:a16="http://schemas.microsoft.com/office/drawing/2014/main" id="{8F1AEE95-0B7D-A747-4B75-9AD4112E3B81}"/>
+              </a:ext>
+            </a:extLst>
+          </p:cNvPr>
+          <p:cNvPicPr>
+            <a:picLocks noGrp="1" noChangeAspect="1"/>
+          </p:cNvPicPr>
+          <p:nvPr>
+            <p:ph sz="half" idx="2"/>
+          </p:nvPr>
+        </p:nvPicPr>
+        <p:blipFill>
+          <a:blip r:embed="rId3">
+            <a:extLst>
+              <a:ext uri="{28A0092B-C50C-407E-A947-70E740481C1C}">
+                <a14:useLocalDpi xmlns:a14="http://schemas.microsoft.com/office/drawing/2010/main" val="0"/>
+              </a:ext>
+            </a:extLst>
+          </a:blip>
+          <a:stretch>
+            <a:fillRect/>
+          </a:stretch>
+        </p:blipFill>
+        <p:spPr>
+          <a:xfrm>
+            <a:off x="6172200" y="2626144"/>
+            <a:ext cx="5181600" cy="2750300"/>
+          </a:xfrm>
+        </p:spPr>
+      </p:pic>
+      <p:sp>
+        <p:nvSpPr>
+          <p:cNvPr id="14" name="pole tekstowe 13">
+            <a:extLst>
+              <a:ext uri="{FF2B5EF4-FFF2-40B4-BE49-F238E27FC236}">
+                <a16:creationId xmlns:a16="http://schemas.microsoft.com/office/drawing/2014/main" id="{B8626A65-0618-0CDA-F8BC-D83342E1B5DD}"/>
+              </a:ext>
+            </a:extLst>
+          </p:cNvPr>
+          <p:cNvSpPr txBox="1"/>
+          <p:nvPr/>
+        </p:nvSpPr>
+        <p:spPr>
+          <a:xfrm>
+            <a:off x="2329872" y="1875354"/>
+            <a:ext cx="2198255" cy="369332"/>
+          </a:xfrm>
+          <a:prstGeom prst="rect">
+            <a:avLst/>
+          </a:prstGeom>
+          <a:noFill/>
+        </p:spPr>
+        <p:txBody>
+          <a:bodyPr wrap="square" rtlCol="0">
+            <a:spAutoFit/>
+          </a:bodyPr>
+          <a:lstStyle/>
+          <a:p>
+            <a:pPr algn="just"/>
+            <a:r>
+              <a:rPr lang="pl-PL" dirty="0"/>
+              <a:t>RMSE = 0.0928</a:t>
+            </a:r>
+            <a:endParaRPr lang="en-GB" dirty="0"/>
+          </a:p>
+        </p:txBody>
+      </p:sp>
+    </p:spTree>
+    <p:extLst>
+      <p:ext uri="{BB962C8B-B14F-4D97-AF65-F5344CB8AC3E}">
+        <p14:creationId xmlns:p14="http://schemas.microsoft.com/office/powerpoint/2010/main" val="2229303482"/>
       </p:ext>
     </p:extLst>
   </p:cSld>

</xml_diff>

<commit_message>
Shapley values for flattened input
</commit_message>
<xml_diff>
--- a/prezentacja_progres.pptx
+++ b/prezentacja_progres.pptx
@@ -5,7 +5,7 @@
     <p:sldMasterId id="2147483648" r:id="rId1"/>
   </p:sldMasterIdLst>
   <p:notesMasterIdLst>
-    <p:notesMasterId r:id="rId19"/>
+    <p:notesMasterId r:id="rId23"/>
   </p:notesMasterIdLst>
   <p:sldIdLst>
     <p:sldId id="257" r:id="rId2"/>
@@ -25,6 +25,10 @@
     <p:sldId id="275" r:id="rId16"/>
     <p:sldId id="276" r:id="rId17"/>
     <p:sldId id="277" r:id="rId18"/>
+    <p:sldId id="280" r:id="rId19"/>
+    <p:sldId id="278" r:id="rId20"/>
+    <p:sldId id="279" r:id="rId21"/>
+    <p:sldId id="281" r:id="rId22"/>
   </p:sldIdLst>
   <p:sldSz cx="12192000" cy="6858000"/>
   <p:notesSz cx="6858000" cy="9144000"/>
@@ -145,6 +149,10 @@
             <p14:sldId id="275"/>
             <p14:sldId id="276"/>
             <p14:sldId id="277"/>
+            <p14:sldId id="280"/>
+            <p14:sldId id="278"/>
+            <p14:sldId id="279"/>
+            <p14:sldId id="281"/>
           </p14:sldIdLst>
         </p14:section>
       </p14:sectionLst>
@@ -1992,7 +2000,7 @@
           <a:p>
             <a:fld id="{3A98996A-526F-4D12-9A3C-180E559B5F8A}" type="datetimeFigureOut">
               <a:rPr lang="pl-PL" smtClean="0"/>
-              <a:t>25.05.2022</a:t>
+              <a:t>01.06.2022</a:t>
             </a:fld>
             <a:endParaRPr lang="pl-PL"/>
           </a:p>
@@ -2406,7 +2414,7 @@
           <a:p>
             <a:fld id="{25F7A364-0BB9-45DB-85EC-48469DF6681C}" type="datetimeFigureOut">
               <a:rPr lang="pl-PL" smtClean="0"/>
-              <a:t>25.05.2022</a:t>
+              <a:t>01.06.2022</a:t>
             </a:fld>
             <a:endParaRPr lang="pl-PL"/>
           </a:p>
@@ -2604,7 +2612,7 @@
           <a:p>
             <a:fld id="{25F7A364-0BB9-45DB-85EC-48469DF6681C}" type="datetimeFigureOut">
               <a:rPr lang="pl-PL" smtClean="0"/>
-              <a:t>25.05.2022</a:t>
+              <a:t>01.06.2022</a:t>
             </a:fld>
             <a:endParaRPr lang="pl-PL"/>
           </a:p>
@@ -2812,7 +2820,7 @@
           <a:p>
             <a:fld id="{25F7A364-0BB9-45DB-85EC-48469DF6681C}" type="datetimeFigureOut">
               <a:rPr lang="pl-PL" smtClean="0"/>
-              <a:t>25.05.2022</a:t>
+              <a:t>01.06.2022</a:t>
             </a:fld>
             <a:endParaRPr lang="pl-PL"/>
           </a:p>
@@ -3010,7 +3018,7 @@
           <a:p>
             <a:fld id="{25F7A364-0BB9-45DB-85EC-48469DF6681C}" type="datetimeFigureOut">
               <a:rPr lang="pl-PL" smtClean="0"/>
-              <a:t>25.05.2022</a:t>
+              <a:t>01.06.2022</a:t>
             </a:fld>
             <a:endParaRPr lang="pl-PL"/>
           </a:p>
@@ -3285,7 +3293,7 @@
           <a:p>
             <a:fld id="{25F7A364-0BB9-45DB-85EC-48469DF6681C}" type="datetimeFigureOut">
               <a:rPr lang="pl-PL" smtClean="0"/>
-              <a:t>25.05.2022</a:t>
+              <a:t>01.06.2022</a:t>
             </a:fld>
             <a:endParaRPr lang="pl-PL"/>
           </a:p>
@@ -3550,7 +3558,7 @@
           <a:p>
             <a:fld id="{25F7A364-0BB9-45DB-85EC-48469DF6681C}" type="datetimeFigureOut">
               <a:rPr lang="pl-PL" smtClean="0"/>
-              <a:t>25.05.2022</a:t>
+              <a:t>01.06.2022</a:t>
             </a:fld>
             <a:endParaRPr lang="pl-PL"/>
           </a:p>
@@ -3962,7 +3970,7 @@
           <a:p>
             <a:fld id="{25F7A364-0BB9-45DB-85EC-48469DF6681C}" type="datetimeFigureOut">
               <a:rPr lang="pl-PL" smtClean="0"/>
-              <a:t>25.05.2022</a:t>
+              <a:t>01.06.2022</a:t>
             </a:fld>
             <a:endParaRPr lang="pl-PL"/>
           </a:p>
@@ -4103,7 +4111,7 @@
           <a:p>
             <a:fld id="{25F7A364-0BB9-45DB-85EC-48469DF6681C}" type="datetimeFigureOut">
               <a:rPr lang="pl-PL" smtClean="0"/>
-              <a:t>25.05.2022</a:t>
+              <a:t>01.06.2022</a:t>
             </a:fld>
             <a:endParaRPr lang="pl-PL"/>
           </a:p>
@@ -4216,7 +4224,7 @@
           <a:p>
             <a:fld id="{25F7A364-0BB9-45DB-85EC-48469DF6681C}" type="datetimeFigureOut">
               <a:rPr lang="pl-PL" smtClean="0"/>
-              <a:t>25.05.2022</a:t>
+              <a:t>01.06.2022</a:t>
             </a:fld>
             <a:endParaRPr lang="pl-PL"/>
           </a:p>
@@ -4527,7 +4535,7 @@
           <a:p>
             <a:fld id="{25F7A364-0BB9-45DB-85EC-48469DF6681C}" type="datetimeFigureOut">
               <a:rPr lang="pl-PL" smtClean="0"/>
-              <a:t>25.05.2022</a:t>
+              <a:t>01.06.2022</a:t>
             </a:fld>
             <a:endParaRPr lang="pl-PL"/>
           </a:p>
@@ -4815,7 +4823,7 @@
           <a:p>
             <a:fld id="{25F7A364-0BB9-45DB-85EC-48469DF6681C}" type="datetimeFigureOut">
               <a:rPr lang="pl-PL" smtClean="0"/>
-              <a:t>25.05.2022</a:t>
+              <a:t>01.06.2022</a:t>
             </a:fld>
             <a:endParaRPr lang="pl-PL"/>
           </a:p>
@@ -5056,7 +5064,7 @@
           <a:p>
             <a:fld id="{25F7A364-0BB9-45DB-85EC-48469DF6681C}" type="datetimeFigureOut">
               <a:rPr lang="pl-PL" smtClean="0"/>
-              <a:t>25.05.2022</a:t>
+              <a:t>01.06.2022</a:t>
             </a:fld>
             <a:endParaRPr lang="pl-PL"/>
           </a:p>
@@ -7240,41 +7248,6 @@
           </a:p>
         </p:txBody>
       </p:sp>
-      <p:pic>
-        <p:nvPicPr>
-          <p:cNvPr id="9" name="Symbol zastępczy zawartości 8">
-            <a:extLst>
-              <a:ext uri="{FF2B5EF4-FFF2-40B4-BE49-F238E27FC236}">
-                <a16:creationId xmlns:a16="http://schemas.microsoft.com/office/drawing/2014/main" id="{F5EDC02D-3F2A-7E0A-A4F2-FAEAF61955A7}"/>
-              </a:ext>
-            </a:extLst>
-          </p:cNvPr>
-          <p:cNvPicPr>
-            <a:picLocks noGrp="1" noChangeAspect="1"/>
-          </p:cNvPicPr>
-          <p:nvPr>
-            <p:ph sz="half" idx="2"/>
-          </p:nvPr>
-        </p:nvPicPr>
-        <p:blipFill>
-          <a:blip r:embed="rId2">
-            <a:extLst>
-              <a:ext uri="{28A0092B-C50C-407E-A947-70E740481C1C}">
-                <a14:useLocalDpi xmlns:a14="http://schemas.microsoft.com/office/drawing/2010/main" val="0"/>
-              </a:ext>
-            </a:extLst>
-          </a:blip>
-          <a:stretch>
-            <a:fillRect/>
-          </a:stretch>
-        </p:blipFill>
-        <p:spPr>
-          <a:xfrm>
-            <a:off x="839788" y="2644843"/>
-            <a:ext cx="5157787" cy="3405052"/>
-          </a:xfrm>
-        </p:spPr>
-      </p:pic>
       <p:sp>
         <p:nvSpPr>
           <p:cNvPr id="16" name="Symbol zastępczy tekstu 15">
@@ -7304,41 +7277,6 @@
           </a:p>
         </p:txBody>
       </p:sp>
-      <p:pic>
-        <p:nvPicPr>
-          <p:cNvPr id="12" name="Symbol zastępczy zawartości 11">
-            <a:extLst>
-              <a:ext uri="{FF2B5EF4-FFF2-40B4-BE49-F238E27FC236}">
-                <a16:creationId xmlns:a16="http://schemas.microsoft.com/office/drawing/2014/main" id="{33BCE424-AB39-76F3-D472-67A08F19CD4B}"/>
-              </a:ext>
-            </a:extLst>
-          </p:cNvPr>
-          <p:cNvPicPr>
-            <a:picLocks noGrp="1" noChangeAspect="1"/>
-          </p:cNvPicPr>
-          <p:nvPr>
-            <p:ph sz="quarter" idx="4"/>
-          </p:nvPr>
-        </p:nvPicPr>
-        <p:blipFill>
-          <a:blip r:embed="rId3">
-            <a:extLst>
-              <a:ext uri="{28A0092B-C50C-407E-A947-70E740481C1C}">
-                <a14:useLocalDpi xmlns:a14="http://schemas.microsoft.com/office/drawing/2010/main" val="0"/>
-              </a:ext>
-            </a:extLst>
-          </a:blip>
-          <a:stretch>
-            <a:fillRect/>
-          </a:stretch>
-        </p:blipFill>
-        <p:spPr>
-          <a:xfrm>
-            <a:off x="6172200" y="2636458"/>
-            <a:ext cx="5183188" cy="3421821"/>
-          </a:xfrm>
-        </p:spPr>
-      </p:pic>
       <p:cxnSp>
         <p:nvCxnSpPr>
           <p:cNvPr id="5" name="Łącznik prosty 4">
@@ -7382,10 +7320,621 @@
           </a:fontRef>
         </p:style>
       </p:cxnSp>
+      <p:pic>
+        <p:nvPicPr>
+          <p:cNvPr id="3074" name="Picture 2">
+            <a:extLst>
+              <a:ext uri="{FF2B5EF4-FFF2-40B4-BE49-F238E27FC236}">
+                <a16:creationId xmlns:a16="http://schemas.microsoft.com/office/drawing/2014/main" id="{A0307F0D-18D3-205B-09AE-34E059FFA449}"/>
+              </a:ext>
+            </a:extLst>
+          </p:cNvPr>
+          <p:cNvPicPr>
+            <a:picLocks noGrp="1" noChangeAspect="1" noChangeArrowheads="1"/>
+          </p:cNvPicPr>
+          <p:nvPr>
+            <p:ph sz="half" idx="2"/>
+          </p:nvPr>
+        </p:nvPicPr>
+        <p:blipFill>
+          <a:blip r:embed="rId2">
+            <a:extLst>
+              <a:ext uri="{28A0092B-C50C-407E-A947-70E740481C1C}">
+                <a14:useLocalDpi xmlns:a14="http://schemas.microsoft.com/office/drawing/2010/main" val="0"/>
+              </a:ext>
+            </a:extLst>
+          </a:blip>
+          <a:srcRect/>
+          <a:stretch>
+            <a:fillRect/>
+          </a:stretch>
+        </p:blipFill>
+        <p:spPr bwMode="auto">
+          <a:xfrm>
+            <a:off x="839788" y="2644843"/>
+            <a:ext cx="5157787" cy="3405052"/>
+          </a:xfrm>
+          <a:prstGeom prst="rect">
+            <a:avLst/>
+          </a:prstGeom>
+          <a:noFill/>
+          <a:extLst>
+            <a:ext uri="{909E8E84-426E-40DD-AFC4-6F175D3DCCD1}">
+              <a14:hiddenFill xmlns:a14="http://schemas.microsoft.com/office/drawing/2010/main">
+                <a:solidFill>
+                  <a:srgbClr val="FFFFFF"/>
+                </a:solidFill>
+              </a14:hiddenFill>
+            </a:ext>
+          </a:extLst>
+        </p:spPr>
+      </p:pic>
+      <p:pic>
+        <p:nvPicPr>
+          <p:cNvPr id="3076" name="Picture 4">
+            <a:extLst>
+              <a:ext uri="{FF2B5EF4-FFF2-40B4-BE49-F238E27FC236}">
+                <a16:creationId xmlns:a16="http://schemas.microsoft.com/office/drawing/2014/main" id="{8CF96657-0AD2-7493-60B1-50836AE08E97}"/>
+              </a:ext>
+            </a:extLst>
+          </p:cNvPr>
+          <p:cNvPicPr>
+            <a:picLocks noGrp="1" noChangeAspect="1" noChangeArrowheads="1"/>
+          </p:cNvPicPr>
+          <p:nvPr>
+            <p:ph sz="quarter" idx="4"/>
+          </p:nvPr>
+        </p:nvPicPr>
+        <p:blipFill>
+          <a:blip r:embed="rId3">
+            <a:extLst>
+              <a:ext uri="{28A0092B-C50C-407E-A947-70E740481C1C}">
+                <a14:useLocalDpi xmlns:a14="http://schemas.microsoft.com/office/drawing/2010/main" val="0"/>
+              </a:ext>
+            </a:extLst>
+          </a:blip>
+          <a:srcRect/>
+          <a:stretch>
+            <a:fillRect/>
+          </a:stretch>
+        </p:blipFill>
+        <p:spPr bwMode="auto">
+          <a:xfrm>
+            <a:off x="6172200" y="2636458"/>
+            <a:ext cx="5183188" cy="3421821"/>
+          </a:xfrm>
+          <a:prstGeom prst="rect">
+            <a:avLst/>
+          </a:prstGeom>
+          <a:noFill/>
+          <a:extLst>
+            <a:ext uri="{909E8E84-426E-40DD-AFC4-6F175D3DCCD1}">
+              <a14:hiddenFill xmlns:a14="http://schemas.microsoft.com/office/drawing/2010/main">
+                <a:solidFill>
+                  <a:srgbClr val="FFFFFF"/>
+                </a:solidFill>
+              </a14:hiddenFill>
+            </a:ext>
+          </a:extLst>
+        </p:spPr>
+      </p:pic>
     </p:spTree>
     <p:extLst>
       <p:ext uri="{BB962C8B-B14F-4D97-AF65-F5344CB8AC3E}">
         <p14:creationId xmlns:p14="http://schemas.microsoft.com/office/powerpoint/2010/main" val="3462325501"/>
+      </p:ext>
+    </p:extLst>
+  </p:cSld>
+  <p:clrMapOvr>
+    <a:masterClrMapping/>
+  </p:clrMapOvr>
+</p:sld>
+</file>
+
+<file path=ppt/slides/slide18.xml><?xml version="1.0" encoding="utf-8"?>
+<p:sld xmlns:a="http://schemas.openxmlformats.org/drawingml/2006/main" xmlns:r="http://schemas.openxmlformats.org/officeDocument/2006/relationships" xmlns:p="http://schemas.openxmlformats.org/presentationml/2006/main">
+  <p:cSld>
+    <p:spTree>
+      <p:nvGrpSpPr>
+        <p:cNvPr id="1" name=""/>
+        <p:cNvGrpSpPr/>
+        <p:nvPr/>
+      </p:nvGrpSpPr>
+      <p:grpSpPr>
+        <a:xfrm>
+          <a:off x="0" y="0"/>
+          <a:ext cx="0" cy="0"/>
+          <a:chOff x="0" y="0"/>
+          <a:chExt cx="0" cy="0"/>
+        </a:xfrm>
+      </p:grpSpPr>
+      <p:sp>
+        <p:nvSpPr>
+          <p:cNvPr id="2" name="Tytuł 1">
+            <a:extLst>
+              <a:ext uri="{FF2B5EF4-FFF2-40B4-BE49-F238E27FC236}">
+                <a16:creationId xmlns:a16="http://schemas.microsoft.com/office/drawing/2014/main" id="{846B20A1-DF77-49E9-9FC9-D8D9FFADA71B}"/>
+              </a:ext>
+            </a:extLst>
+          </p:cNvPr>
+          <p:cNvSpPr>
+            <a:spLocks noGrp="1"/>
+          </p:cNvSpPr>
+          <p:nvPr>
+            <p:ph type="title"/>
+          </p:nvPr>
+        </p:nvSpPr>
+        <p:spPr/>
+        <p:txBody>
+          <a:bodyPr/>
+          <a:lstStyle/>
+          <a:p>
+            <a:r>
+              <a:rPr lang="pl-PL" dirty="0" err="1">
+                <a:solidFill>
+                  <a:schemeClr val="accent1">
+                    <a:lumMod val="75000"/>
+                  </a:schemeClr>
+                </a:solidFill>
+              </a:rPr>
+              <a:t>Shapley</a:t>
+            </a:r>
+            <a:r>
+              <a:rPr lang="pl-PL" dirty="0">
+                <a:solidFill>
+                  <a:schemeClr val="accent1">
+                    <a:lumMod val="75000"/>
+                  </a:schemeClr>
+                </a:solidFill>
+              </a:rPr>
+              <a:t> </a:t>
+            </a:r>
+            <a:r>
+              <a:rPr lang="pl-PL" dirty="0" err="1">
+                <a:solidFill>
+                  <a:schemeClr val="accent1">
+                    <a:lumMod val="75000"/>
+                  </a:schemeClr>
+                </a:solidFill>
+              </a:rPr>
+              <a:t>values</a:t>
+            </a:r>
+            <a:r>
+              <a:rPr lang="pl-PL" dirty="0">
+                <a:solidFill>
+                  <a:schemeClr val="accent1">
+                    <a:lumMod val="75000"/>
+                  </a:schemeClr>
+                </a:solidFill>
+              </a:rPr>
+              <a:t> – </a:t>
+            </a:r>
+            <a:r>
+              <a:rPr lang="pl-PL" dirty="0" err="1">
+                <a:solidFill>
+                  <a:schemeClr val="accent1">
+                    <a:lumMod val="75000"/>
+                  </a:schemeClr>
+                </a:solidFill>
+              </a:rPr>
+              <a:t>flattened</a:t>
+            </a:r>
+            <a:endParaRPr lang="pl-PL" dirty="0">
+              <a:solidFill>
+                <a:schemeClr val="accent1">
+                  <a:lumMod val="75000"/>
+                </a:schemeClr>
+              </a:solidFill>
+            </a:endParaRPr>
+          </a:p>
+        </p:txBody>
+      </p:sp>
+      <p:sp>
+        <p:nvSpPr>
+          <p:cNvPr id="8" name="Symbol zastępczy tekstu 7">
+            <a:extLst>
+              <a:ext uri="{FF2B5EF4-FFF2-40B4-BE49-F238E27FC236}">
+                <a16:creationId xmlns:a16="http://schemas.microsoft.com/office/drawing/2014/main" id="{179A8A9A-A869-5E3B-B177-09B046EC6063}"/>
+              </a:ext>
+            </a:extLst>
+          </p:cNvPr>
+          <p:cNvSpPr>
+            <a:spLocks noGrp="1"/>
+          </p:cNvSpPr>
+          <p:nvPr>
+            <p:ph type="body" idx="1"/>
+          </p:nvPr>
+        </p:nvSpPr>
+        <p:spPr>
+          <a:xfrm>
+            <a:off x="839788" y="1681163"/>
+            <a:ext cx="5157787" cy="424728"/>
+          </a:xfrm>
+        </p:spPr>
+        <p:txBody>
+          <a:bodyPr/>
+          <a:lstStyle/>
+          <a:p>
+            <a:r>
+              <a:rPr lang="pl-PL" dirty="0" err="1"/>
+              <a:t>Dense</a:t>
+            </a:r>
+            <a:endParaRPr lang="en-GB" dirty="0"/>
+          </a:p>
+        </p:txBody>
+      </p:sp>
+      <p:sp>
+        <p:nvSpPr>
+          <p:cNvPr id="10" name="Symbol zastępczy tekstu 9">
+            <a:extLst>
+              <a:ext uri="{FF2B5EF4-FFF2-40B4-BE49-F238E27FC236}">
+                <a16:creationId xmlns:a16="http://schemas.microsoft.com/office/drawing/2014/main" id="{0B215600-0797-E6C0-255E-5EA975AC7A56}"/>
+              </a:ext>
+            </a:extLst>
+          </p:cNvPr>
+          <p:cNvSpPr>
+            <a:spLocks noGrp="1"/>
+          </p:cNvSpPr>
+          <p:nvPr>
+            <p:ph type="body" sz="quarter" idx="3"/>
+          </p:nvPr>
+        </p:nvSpPr>
+        <p:spPr>
+          <a:xfrm>
+            <a:off x="6172200" y="1681163"/>
+            <a:ext cx="5183188" cy="424726"/>
+          </a:xfrm>
+        </p:spPr>
+        <p:txBody>
+          <a:bodyPr/>
+          <a:lstStyle/>
+          <a:p>
+            <a:r>
+              <a:rPr lang="pl-PL" dirty="0"/>
+              <a:t>LSTM</a:t>
+            </a:r>
+            <a:endParaRPr lang="en-GB" dirty="0"/>
+          </a:p>
+        </p:txBody>
+      </p:sp>
+      <p:cxnSp>
+        <p:nvCxnSpPr>
+          <p:cNvPr id="5" name="Łącznik prosty 4">
+            <a:extLst>
+              <a:ext uri="{FF2B5EF4-FFF2-40B4-BE49-F238E27FC236}">
+                <a16:creationId xmlns:a16="http://schemas.microsoft.com/office/drawing/2014/main" id="{3B41ED5C-B54D-4CD7-BD3A-74F3EBB43590}"/>
+              </a:ext>
+            </a:extLst>
+          </p:cNvPr>
+          <p:cNvCxnSpPr/>
+          <p:nvPr/>
+        </p:nvCxnSpPr>
+        <p:spPr>
+          <a:xfrm>
+            <a:off x="0" y="1434517"/>
+            <a:ext cx="12192000" cy="0"/>
+          </a:xfrm>
+          <a:prstGeom prst="line">
+            <a:avLst/>
+          </a:prstGeom>
+          <a:ln w="38100">
+            <a:solidFill>
+              <a:schemeClr val="accent1">
+                <a:lumMod val="75000"/>
+              </a:schemeClr>
+            </a:solidFill>
+          </a:ln>
+        </p:spPr>
+        <p:style>
+          <a:lnRef idx="1">
+            <a:schemeClr val="accent1"/>
+          </a:lnRef>
+          <a:fillRef idx="0">
+            <a:schemeClr val="accent1"/>
+          </a:fillRef>
+          <a:effectRef idx="0">
+            <a:schemeClr val="accent1"/>
+          </a:effectRef>
+          <a:fontRef idx="minor">
+            <a:schemeClr val="tx1"/>
+          </a:fontRef>
+        </p:style>
+      </p:cxnSp>
+      <p:pic>
+        <p:nvPicPr>
+          <p:cNvPr id="1028" name="Picture 4">
+            <a:extLst>
+              <a:ext uri="{FF2B5EF4-FFF2-40B4-BE49-F238E27FC236}">
+                <a16:creationId xmlns:a16="http://schemas.microsoft.com/office/drawing/2014/main" id="{048663C3-8D41-C63F-2A74-440B0D65C00C}"/>
+              </a:ext>
+            </a:extLst>
+          </p:cNvPr>
+          <p:cNvPicPr>
+            <a:picLocks noGrp="1" noChangeAspect="1" noChangeArrowheads="1"/>
+          </p:cNvPicPr>
+          <p:nvPr>
+            <p:ph sz="half" idx="2"/>
+          </p:nvPr>
+        </p:nvPicPr>
+        <p:blipFill>
+          <a:blip r:embed="rId2">
+            <a:extLst>
+              <a:ext uri="{28A0092B-C50C-407E-A947-70E740481C1C}">
+                <a14:useLocalDpi xmlns:a14="http://schemas.microsoft.com/office/drawing/2010/main" val="0"/>
+              </a:ext>
+            </a:extLst>
+          </a:blip>
+          <a:srcRect/>
+          <a:stretch>
+            <a:fillRect/>
+          </a:stretch>
+        </p:blipFill>
+        <p:spPr bwMode="auto">
+          <a:xfrm>
+            <a:off x="972062" y="2105889"/>
+            <a:ext cx="4421691" cy="4083774"/>
+          </a:xfrm>
+          <a:prstGeom prst="rect">
+            <a:avLst/>
+          </a:prstGeom>
+          <a:noFill/>
+          <a:extLst>
+            <a:ext uri="{909E8E84-426E-40DD-AFC4-6F175D3DCCD1}">
+              <a14:hiddenFill xmlns:a14="http://schemas.microsoft.com/office/drawing/2010/main">
+                <a:solidFill>
+                  <a:srgbClr val="FFFFFF"/>
+                </a:solidFill>
+              </a14:hiddenFill>
+            </a:ext>
+          </a:extLst>
+        </p:spPr>
+      </p:pic>
+      <p:pic>
+        <p:nvPicPr>
+          <p:cNvPr id="1030" name="Picture 6">
+            <a:extLst>
+              <a:ext uri="{FF2B5EF4-FFF2-40B4-BE49-F238E27FC236}">
+                <a16:creationId xmlns:a16="http://schemas.microsoft.com/office/drawing/2014/main" id="{3269D9DB-F81C-98A0-3DD9-DA1E388BD8AB}"/>
+              </a:ext>
+            </a:extLst>
+          </p:cNvPr>
+          <p:cNvPicPr>
+            <a:picLocks noGrp="1" noChangeAspect="1" noChangeArrowheads="1"/>
+          </p:cNvPicPr>
+          <p:nvPr>
+            <p:ph sz="quarter" idx="4"/>
+          </p:nvPr>
+        </p:nvPicPr>
+        <p:blipFill>
+          <a:blip r:embed="rId3">
+            <a:extLst>
+              <a:ext uri="{28A0092B-C50C-407E-A947-70E740481C1C}">
+                <a14:useLocalDpi xmlns:a14="http://schemas.microsoft.com/office/drawing/2010/main" val="0"/>
+              </a:ext>
+            </a:extLst>
+          </a:blip>
+          <a:srcRect/>
+          <a:stretch>
+            <a:fillRect/>
+          </a:stretch>
+        </p:blipFill>
+        <p:spPr bwMode="auto">
+          <a:xfrm>
+            <a:off x="6798248" y="2105889"/>
+            <a:ext cx="4356984" cy="4083774"/>
+          </a:xfrm>
+          <a:prstGeom prst="rect">
+            <a:avLst/>
+          </a:prstGeom>
+          <a:noFill/>
+          <a:extLst>
+            <a:ext uri="{909E8E84-426E-40DD-AFC4-6F175D3DCCD1}">
+              <a14:hiddenFill xmlns:a14="http://schemas.microsoft.com/office/drawing/2010/main">
+                <a:solidFill>
+                  <a:srgbClr val="FFFFFF"/>
+                </a:solidFill>
+              </a14:hiddenFill>
+            </a:ext>
+          </a:extLst>
+        </p:spPr>
+      </p:pic>
+    </p:spTree>
+    <p:extLst>
+      <p:ext uri="{BB962C8B-B14F-4D97-AF65-F5344CB8AC3E}">
+        <p14:creationId xmlns:p14="http://schemas.microsoft.com/office/powerpoint/2010/main" val="1015660433"/>
+      </p:ext>
+    </p:extLst>
+  </p:cSld>
+  <p:clrMapOvr>
+    <a:masterClrMapping/>
+  </p:clrMapOvr>
+</p:sld>
+</file>
+
+<file path=ppt/slides/slide19.xml><?xml version="1.0" encoding="utf-8"?>
+<p:sld xmlns:a="http://schemas.openxmlformats.org/drawingml/2006/main" xmlns:r="http://schemas.openxmlformats.org/officeDocument/2006/relationships" xmlns:p="http://schemas.openxmlformats.org/presentationml/2006/main">
+  <p:cSld>
+    <p:spTree>
+      <p:nvGrpSpPr>
+        <p:cNvPr id="1" name=""/>
+        <p:cNvGrpSpPr/>
+        <p:nvPr/>
+      </p:nvGrpSpPr>
+      <p:grpSpPr>
+        <a:xfrm>
+          <a:off x="0" y="0"/>
+          <a:ext cx="0" cy="0"/>
+          <a:chOff x="0" y="0"/>
+          <a:chExt cx="0" cy="0"/>
+        </a:xfrm>
+      </p:grpSpPr>
+      <p:sp>
+        <p:nvSpPr>
+          <p:cNvPr id="2" name="Tytuł 1">
+            <a:extLst>
+              <a:ext uri="{FF2B5EF4-FFF2-40B4-BE49-F238E27FC236}">
+                <a16:creationId xmlns:a16="http://schemas.microsoft.com/office/drawing/2014/main" id="{846B20A1-DF77-49E9-9FC9-D8D9FFADA71B}"/>
+              </a:ext>
+            </a:extLst>
+          </p:cNvPr>
+          <p:cNvSpPr>
+            <a:spLocks noGrp="1"/>
+          </p:cNvSpPr>
+          <p:nvPr>
+            <p:ph type="title"/>
+          </p:nvPr>
+        </p:nvSpPr>
+        <p:spPr/>
+        <p:txBody>
+          <a:bodyPr/>
+          <a:lstStyle/>
+          <a:p>
+            <a:r>
+              <a:rPr lang="pl-PL" dirty="0">
+                <a:solidFill>
+                  <a:schemeClr val="accent1">
+                    <a:lumMod val="75000"/>
+                  </a:schemeClr>
+                </a:solidFill>
+              </a:rPr>
+              <a:t>LSTM </a:t>
+            </a:r>
+            <a:r>
+              <a:rPr lang="pl-PL" dirty="0" err="1">
+                <a:solidFill>
+                  <a:schemeClr val="accent1">
+                    <a:lumMod val="75000"/>
+                  </a:schemeClr>
+                </a:solidFill>
+              </a:rPr>
+              <a:t>without</a:t>
+            </a:r>
+            <a:r>
+              <a:rPr lang="pl-PL" dirty="0">
+                <a:solidFill>
+                  <a:schemeClr val="accent1">
+                    <a:lumMod val="75000"/>
+                  </a:schemeClr>
+                </a:solidFill>
+              </a:rPr>
+              <a:t> </a:t>
+            </a:r>
+            <a:r>
+              <a:rPr lang="pl-PL" dirty="0" err="1">
+                <a:solidFill>
+                  <a:schemeClr val="accent1">
+                    <a:lumMod val="75000"/>
+                  </a:schemeClr>
+                </a:solidFill>
+              </a:rPr>
+              <a:t>time</a:t>
+            </a:r>
+            <a:r>
+              <a:rPr lang="pl-PL" dirty="0">
+                <a:solidFill>
+                  <a:schemeClr val="accent1">
+                    <a:lumMod val="75000"/>
+                  </a:schemeClr>
+                </a:solidFill>
+              </a:rPr>
+              <a:t> </a:t>
+            </a:r>
+            <a:r>
+              <a:rPr lang="pl-PL" dirty="0" err="1">
+                <a:solidFill>
+                  <a:schemeClr val="accent1">
+                    <a:lumMod val="75000"/>
+                  </a:schemeClr>
+                </a:solidFill>
+              </a:rPr>
+              <a:t>variables</a:t>
+            </a:r>
+            <a:endParaRPr lang="pl-PL" dirty="0">
+              <a:solidFill>
+                <a:schemeClr val="accent1">
+                  <a:lumMod val="75000"/>
+                </a:schemeClr>
+              </a:solidFill>
+            </a:endParaRPr>
+          </a:p>
+        </p:txBody>
+      </p:sp>
+      <p:cxnSp>
+        <p:nvCxnSpPr>
+          <p:cNvPr id="5" name="Łącznik prosty 4">
+            <a:extLst>
+              <a:ext uri="{FF2B5EF4-FFF2-40B4-BE49-F238E27FC236}">
+                <a16:creationId xmlns:a16="http://schemas.microsoft.com/office/drawing/2014/main" id="{3B41ED5C-B54D-4CD7-BD3A-74F3EBB43590}"/>
+              </a:ext>
+            </a:extLst>
+          </p:cNvPr>
+          <p:cNvCxnSpPr/>
+          <p:nvPr/>
+        </p:nvCxnSpPr>
+        <p:spPr>
+          <a:xfrm>
+            <a:off x="0" y="1434517"/>
+            <a:ext cx="12192000" cy="0"/>
+          </a:xfrm>
+          <a:prstGeom prst="line">
+            <a:avLst/>
+          </a:prstGeom>
+          <a:ln w="38100">
+            <a:solidFill>
+              <a:schemeClr val="accent1">
+                <a:lumMod val="75000"/>
+              </a:schemeClr>
+            </a:solidFill>
+          </a:ln>
+        </p:spPr>
+        <p:style>
+          <a:lnRef idx="1">
+            <a:schemeClr val="accent1"/>
+          </a:lnRef>
+          <a:fillRef idx="0">
+            <a:schemeClr val="accent1"/>
+          </a:fillRef>
+          <a:effectRef idx="0">
+            <a:schemeClr val="accent1"/>
+          </a:effectRef>
+          <a:fontRef idx="minor">
+            <a:schemeClr val="tx1"/>
+          </a:fontRef>
+        </p:style>
+      </p:cxnSp>
+      <p:pic>
+        <p:nvPicPr>
+          <p:cNvPr id="7" name="Symbol zastępczy zawartości 6">
+            <a:extLst>
+              <a:ext uri="{FF2B5EF4-FFF2-40B4-BE49-F238E27FC236}">
+                <a16:creationId xmlns:a16="http://schemas.microsoft.com/office/drawing/2014/main" id="{5BFF77C7-0C96-3A71-541F-D9F043D7B593}"/>
+              </a:ext>
+            </a:extLst>
+          </p:cNvPr>
+          <p:cNvPicPr>
+            <a:picLocks noGrp="1" noChangeAspect="1"/>
+          </p:cNvPicPr>
+          <p:nvPr>
+            <p:ph idx="1"/>
+          </p:nvPr>
+        </p:nvPicPr>
+        <p:blipFill>
+          <a:blip r:embed="rId2"/>
+          <a:stretch>
+            <a:fillRect/>
+          </a:stretch>
+        </p:blipFill>
+        <p:spPr>
+          <a:xfrm>
+            <a:off x="1909762" y="2039144"/>
+            <a:ext cx="8372475" cy="3924300"/>
+          </a:xfrm>
+        </p:spPr>
+      </p:pic>
+    </p:spTree>
+    <p:extLst>
+      <p:ext uri="{BB962C8B-B14F-4D97-AF65-F5344CB8AC3E}">
+        <p14:creationId xmlns:p14="http://schemas.microsoft.com/office/powerpoint/2010/main" val="560290103"/>
       </p:ext>
     </p:extLst>
   </p:cSld>
@@ -7563,6 +8112,502 @@
     <p:extLst>
       <p:ext uri="{BB962C8B-B14F-4D97-AF65-F5344CB8AC3E}">
         <p14:creationId xmlns:p14="http://schemas.microsoft.com/office/powerpoint/2010/main" val="2807628579"/>
+      </p:ext>
+    </p:extLst>
+  </p:cSld>
+  <p:clrMapOvr>
+    <a:masterClrMapping/>
+  </p:clrMapOvr>
+</p:sld>
+</file>
+
+<file path=ppt/slides/slide20.xml><?xml version="1.0" encoding="utf-8"?>
+<p:sld xmlns:a="http://schemas.openxmlformats.org/drawingml/2006/main" xmlns:r="http://schemas.openxmlformats.org/officeDocument/2006/relationships" xmlns:p="http://schemas.openxmlformats.org/presentationml/2006/main">
+  <p:cSld>
+    <p:spTree>
+      <p:nvGrpSpPr>
+        <p:cNvPr id="1" name=""/>
+        <p:cNvGrpSpPr/>
+        <p:nvPr/>
+      </p:nvGrpSpPr>
+      <p:grpSpPr>
+        <a:xfrm>
+          <a:off x="0" y="0"/>
+          <a:ext cx="0" cy="0"/>
+          <a:chOff x="0" y="0"/>
+          <a:chExt cx="0" cy="0"/>
+        </a:xfrm>
+      </p:grpSpPr>
+      <p:sp>
+        <p:nvSpPr>
+          <p:cNvPr id="2" name="Tytuł 1">
+            <a:extLst>
+              <a:ext uri="{FF2B5EF4-FFF2-40B4-BE49-F238E27FC236}">
+                <a16:creationId xmlns:a16="http://schemas.microsoft.com/office/drawing/2014/main" id="{846B20A1-DF77-49E9-9FC9-D8D9FFADA71B}"/>
+              </a:ext>
+            </a:extLst>
+          </p:cNvPr>
+          <p:cNvSpPr>
+            <a:spLocks noGrp="1"/>
+          </p:cNvSpPr>
+          <p:nvPr>
+            <p:ph type="title"/>
+          </p:nvPr>
+        </p:nvSpPr>
+        <p:spPr/>
+        <p:txBody>
+          <a:bodyPr/>
+          <a:lstStyle/>
+          <a:p>
+            <a:r>
+              <a:rPr lang="pl-PL" dirty="0">
+                <a:solidFill>
+                  <a:schemeClr val="accent1">
+                    <a:lumMod val="75000"/>
+                  </a:schemeClr>
+                </a:solidFill>
+              </a:rPr>
+              <a:t>LSTM </a:t>
+            </a:r>
+            <a:r>
+              <a:rPr lang="pl-PL" dirty="0" err="1">
+                <a:solidFill>
+                  <a:schemeClr val="accent1">
+                    <a:lumMod val="75000"/>
+                  </a:schemeClr>
+                </a:solidFill>
+              </a:rPr>
+              <a:t>without</a:t>
+            </a:r>
+            <a:r>
+              <a:rPr lang="pl-PL" dirty="0">
+                <a:solidFill>
+                  <a:schemeClr val="accent1">
+                    <a:lumMod val="75000"/>
+                  </a:schemeClr>
+                </a:solidFill>
+              </a:rPr>
+              <a:t> </a:t>
+            </a:r>
+            <a:r>
+              <a:rPr lang="pl-PL" dirty="0" err="1">
+                <a:solidFill>
+                  <a:schemeClr val="accent1">
+                    <a:lumMod val="75000"/>
+                  </a:schemeClr>
+                </a:solidFill>
+              </a:rPr>
+              <a:t>time</a:t>
+            </a:r>
+            <a:r>
+              <a:rPr lang="pl-PL" dirty="0">
+                <a:solidFill>
+                  <a:schemeClr val="accent1">
+                    <a:lumMod val="75000"/>
+                  </a:schemeClr>
+                </a:solidFill>
+              </a:rPr>
+              <a:t> </a:t>
+            </a:r>
+            <a:r>
+              <a:rPr lang="pl-PL" dirty="0" err="1">
+                <a:solidFill>
+                  <a:schemeClr val="accent1">
+                    <a:lumMod val="75000"/>
+                  </a:schemeClr>
+                </a:solidFill>
+              </a:rPr>
+              <a:t>variables</a:t>
+            </a:r>
+            <a:endParaRPr lang="pl-PL" dirty="0">
+              <a:solidFill>
+                <a:schemeClr val="accent1">
+                  <a:lumMod val="75000"/>
+                </a:schemeClr>
+              </a:solidFill>
+            </a:endParaRPr>
+          </a:p>
+        </p:txBody>
+      </p:sp>
+      <p:pic>
+        <p:nvPicPr>
+          <p:cNvPr id="11" name="Symbol zastępczy zawartości 10">
+            <a:extLst>
+              <a:ext uri="{FF2B5EF4-FFF2-40B4-BE49-F238E27FC236}">
+                <a16:creationId xmlns:a16="http://schemas.microsoft.com/office/drawing/2014/main" id="{CC07E7A5-0A7E-E8B6-BFCF-9EBE8709FAB6}"/>
+              </a:ext>
+            </a:extLst>
+          </p:cNvPr>
+          <p:cNvPicPr>
+            <a:picLocks noGrp="1" noChangeAspect="1"/>
+          </p:cNvPicPr>
+          <p:nvPr>
+            <p:ph sz="half" idx="2"/>
+          </p:nvPr>
+        </p:nvPicPr>
+        <p:blipFill>
+          <a:blip r:embed="rId2">
+            <a:extLst>
+              <a:ext uri="{28A0092B-C50C-407E-A947-70E740481C1C}">
+                <a14:useLocalDpi xmlns:a14="http://schemas.microsoft.com/office/drawing/2010/main" val="0"/>
+              </a:ext>
+            </a:extLst>
+          </a:blip>
+          <a:stretch>
+            <a:fillRect/>
+          </a:stretch>
+        </p:blipFill>
+        <p:spPr>
+          <a:xfrm>
+            <a:off x="6172200" y="2626144"/>
+            <a:ext cx="5181600" cy="2750300"/>
+          </a:xfrm>
+        </p:spPr>
+      </p:pic>
+      <p:cxnSp>
+        <p:nvCxnSpPr>
+          <p:cNvPr id="5" name="Łącznik prosty 4">
+            <a:extLst>
+              <a:ext uri="{FF2B5EF4-FFF2-40B4-BE49-F238E27FC236}">
+                <a16:creationId xmlns:a16="http://schemas.microsoft.com/office/drawing/2014/main" id="{3B41ED5C-B54D-4CD7-BD3A-74F3EBB43590}"/>
+              </a:ext>
+            </a:extLst>
+          </p:cNvPr>
+          <p:cNvCxnSpPr/>
+          <p:nvPr/>
+        </p:nvCxnSpPr>
+        <p:spPr>
+          <a:xfrm>
+            <a:off x="0" y="1434517"/>
+            <a:ext cx="12192000" cy="0"/>
+          </a:xfrm>
+          <a:prstGeom prst="line">
+            <a:avLst/>
+          </a:prstGeom>
+          <a:ln w="38100">
+            <a:solidFill>
+              <a:schemeClr val="accent1">
+                <a:lumMod val="75000"/>
+              </a:schemeClr>
+            </a:solidFill>
+          </a:ln>
+        </p:spPr>
+        <p:style>
+          <a:lnRef idx="1">
+            <a:schemeClr val="accent1"/>
+          </a:lnRef>
+          <a:fillRef idx="0">
+            <a:schemeClr val="accent1"/>
+          </a:fillRef>
+          <a:effectRef idx="0">
+            <a:schemeClr val="accent1"/>
+          </a:effectRef>
+          <a:fontRef idx="minor">
+            <a:schemeClr val="tx1"/>
+          </a:fontRef>
+        </p:style>
+      </p:cxnSp>
+      <p:pic>
+        <p:nvPicPr>
+          <p:cNvPr id="9" name="Symbol zastępczy zawartości 8">
+            <a:extLst>
+              <a:ext uri="{FF2B5EF4-FFF2-40B4-BE49-F238E27FC236}">
+                <a16:creationId xmlns:a16="http://schemas.microsoft.com/office/drawing/2014/main" id="{B3401873-4817-0F38-6D7B-A6A8F41C4E57}"/>
+              </a:ext>
+            </a:extLst>
+          </p:cNvPr>
+          <p:cNvPicPr>
+            <a:picLocks noGrp="1" noChangeAspect="1"/>
+          </p:cNvPicPr>
+          <p:nvPr>
+            <p:ph sz="half" idx="1"/>
+          </p:nvPr>
+        </p:nvPicPr>
+        <p:blipFill>
+          <a:blip r:embed="rId3">
+            <a:extLst>
+              <a:ext uri="{28A0092B-C50C-407E-A947-70E740481C1C}">
+                <a14:useLocalDpi xmlns:a14="http://schemas.microsoft.com/office/drawing/2010/main" val="0"/>
+              </a:ext>
+            </a:extLst>
+          </a:blip>
+          <a:stretch>
+            <a:fillRect/>
+          </a:stretch>
+        </p:blipFill>
+        <p:spPr>
+          <a:xfrm>
+            <a:off x="838200" y="2659327"/>
+            <a:ext cx="5181600" cy="2683933"/>
+          </a:xfrm>
+        </p:spPr>
+      </p:pic>
+    </p:spTree>
+    <p:extLst>
+      <p:ext uri="{BB962C8B-B14F-4D97-AF65-F5344CB8AC3E}">
+        <p14:creationId xmlns:p14="http://schemas.microsoft.com/office/powerpoint/2010/main" val="739912553"/>
+      </p:ext>
+    </p:extLst>
+  </p:cSld>
+  <p:clrMapOvr>
+    <a:masterClrMapping/>
+  </p:clrMapOvr>
+</p:sld>
+</file>
+
+<file path=ppt/slides/slide21.xml><?xml version="1.0" encoding="utf-8"?>
+<p:sld xmlns:a="http://schemas.openxmlformats.org/drawingml/2006/main" xmlns:r="http://schemas.openxmlformats.org/officeDocument/2006/relationships" xmlns:p="http://schemas.openxmlformats.org/presentationml/2006/main">
+  <p:cSld>
+    <p:spTree>
+      <p:nvGrpSpPr>
+        <p:cNvPr id="1" name=""/>
+        <p:cNvGrpSpPr/>
+        <p:nvPr/>
+      </p:nvGrpSpPr>
+      <p:grpSpPr>
+        <a:xfrm>
+          <a:off x="0" y="0"/>
+          <a:ext cx="0" cy="0"/>
+          <a:chOff x="0" y="0"/>
+          <a:chExt cx="0" cy="0"/>
+        </a:xfrm>
+      </p:grpSpPr>
+      <p:sp>
+        <p:nvSpPr>
+          <p:cNvPr id="2" name="Tytuł 1">
+            <a:extLst>
+              <a:ext uri="{FF2B5EF4-FFF2-40B4-BE49-F238E27FC236}">
+                <a16:creationId xmlns:a16="http://schemas.microsoft.com/office/drawing/2014/main" id="{846B20A1-DF77-49E9-9FC9-D8D9FFADA71B}"/>
+              </a:ext>
+            </a:extLst>
+          </p:cNvPr>
+          <p:cNvSpPr>
+            <a:spLocks noGrp="1"/>
+          </p:cNvSpPr>
+          <p:nvPr>
+            <p:ph type="title"/>
+          </p:nvPr>
+        </p:nvSpPr>
+        <p:spPr/>
+        <p:txBody>
+          <a:bodyPr/>
+          <a:lstStyle/>
+          <a:p>
+            <a:r>
+              <a:rPr lang="pl-PL" dirty="0">
+                <a:solidFill>
+                  <a:schemeClr val="accent1">
+                    <a:lumMod val="75000"/>
+                  </a:schemeClr>
+                </a:solidFill>
+              </a:rPr>
+              <a:t>LSTM </a:t>
+            </a:r>
+            <a:r>
+              <a:rPr lang="pl-PL" dirty="0" err="1">
+                <a:solidFill>
+                  <a:schemeClr val="accent1">
+                    <a:lumMod val="75000"/>
+                  </a:schemeClr>
+                </a:solidFill>
+              </a:rPr>
+              <a:t>without</a:t>
+            </a:r>
+            <a:r>
+              <a:rPr lang="pl-PL" dirty="0">
+                <a:solidFill>
+                  <a:schemeClr val="accent1">
+                    <a:lumMod val="75000"/>
+                  </a:schemeClr>
+                </a:solidFill>
+              </a:rPr>
+              <a:t> </a:t>
+            </a:r>
+            <a:r>
+              <a:rPr lang="pl-PL" dirty="0" err="1">
+                <a:solidFill>
+                  <a:schemeClr val="accent1">
+                    <a:lumMod val="75000"/>
+                  </a:schemeClr>
+                </a:solidFill>
+              </a:rPr>
+              <a:t>time</a:t>
+            </a:r>
+            <a:r>
+              <a:rPr lang="pl-PL" dirty="0">
+                <a:solidFill>
+                  <a:schemeClr val="accent1">
+                    <a:lumMod val="75000"/>
+                  </a:schemeClr>
+                </a:solidFill>
+              </a:rPr>
+              <a:t> </a:t>
+            </a:r>
+            <a:r>
+              <a:rPr lang="pl-PL" dirty="0" err="1">
+                <a:solidFill>
+                  <a:schemeClr val="accent1">
+                    <a:lumMod val="75000"/>
+                  </a:schemeClr>
+                </a:solidFill>
+              </a:rPr>
+              <a:t>variables</a:t>
+            </a:r>
+            <a:endParaRPr lang="pl-PL" dirty="0">
+              <a:solidFill>
+                <a:schemeClr val="accent1">
+                  <a:lumMod val="75000"/>
+                </a:schemeClr>
+              </a:solidFill>
+            </a:endParaRPr>
+          </a:p>
+        </p:txBody>
+      </p:sp>
+      <p:cxnSp>
+        <p:nvCxnSpPr>
+          <p:cNvPr id="5" name="Łącznik prosty 4">
+            <a:extLst>
+              <a:ext uri="{FF2B5EF4-FFF2-40B4-BE49-F238E27FC236}">
+                <a16:creationId xmlns:a16="http://schemas.microsoft.com/office/drawing/2014/main" id="{3B41ED5C-B54D-4CD7-BD3A-74F3EBB43590}"/>
+              </a:ext>
+            </a:extLst>
+          </p:cNvPr>
+          <p:cNvCxnSpPr/>
+          <p:nvPr/>
+        </p:nvCxnSpPr>
+        <p:spPr>
+          <a:xfrm>
+            <a:off x="0" y="1434517"/>
+            <a:ext cx="12192000" cy="0"/>
+          </a:xfrm>
+          <a:prstGeom prst="line">
+            <a:avLst/>
+          </a:prstGeom>
+          <a:ln w="38100">
+            <a:solidFill>
+              <a:schemeClr val="accent1">
+                <a:lumMod val="75000"/>
+              </a:schemeClr>
+            </a:solidFill>
+          </a:ln>
+        </p:spPr>
+        <p:style>
+          <a:lnRef idx="1">
+            <a:schemeClr val="accent1"/>
+          </a:lnRef>
+          <a:fillRef idx="0">
+            <a:schemeClr val="accent1"/>
+          </a:fillRef>
+          <a:effectRef idx="0">
+            <a:schemeClr val="accent1"/>
+          </a:effectRef>
+          <a:fontRef idx="minor">
+            <a:schemeClr val="tx1"/>
+          </a:fontRef>
+        </p:style>
+      </p:cxnSp>
+      <p:pic>
+        <p:nvPicPr>
+          <p:cNvPr id="2056" name="Picture 8">
+            <a:extLst>
+              <a:ext uri="{FF2B5EF4-FFF2-40B4-BE49-F238E27FC236}">
+                <a16:creationId xmlns:a16="http://schemas.microsoft.com/office/drawing/2014/main" id="{5295A91C-5F91-212D-148C-DF9473A5377F}"/>
+              </a:ext>
+            </a:extLst>
+          </p:cNvPr>
+          <p:cNvPicPr>
+            <a:picLocks noGrp="1" noChangeAspect="1" noChangeArrowheads="1"/>
+          </p:cNvPicPr>
+          <p:nvPr>
+            <p:ph sz="half" idx="1"/>
+          </p:nvPr>
+        </p:nvPicPr>
+        <p:blipFill>
+          <a:blip r:embed="rId2">
+            <a:extLst>
+              <a:ext uri="{28A0092B-C50C-407E-A947-70E740481C1C}">
+                <a14:useLocalDpi xmlns:a14="http://schemas.microsoft.com/office/drawing/2010/main" val="0"/>
+              </a:ext>
+            </a:extLst>
+          </a:blip>
+          <a:srcRect/>
+          <a:stretch>
+            <a:fillRect/>
+          </a:stretch>
+        </p:blipFill>
+        <p:spPr bwMode="auto">
+          <a:xfrm>
+            <a:off x="838200" y="2692162"/>
+            <a:ext cx="5181600" cy="2618264"/>
+          </a:xfrm>
+          <a:prstGeom prst="rect">
+            <a:avLst/>
+          </a:prstGeom>
+          <a:noFill/>
+          <a:extLst>
+            <a:ext uri="{909E8E84-426E-40DD-AFC4-6F175D3DCCD1}">
+              <a14:hiddenFill xmlns:a14="http://schemas.microsoft.com/office/drawing/2010/main">
+                <a:solidFill>
+                  <a:srgbClr val="FFFFFF"/>
+                </a:solidFill>
+              </a14:hiddenFill>
+            </a:ext>
+          </a:extLst>
+        </p:spPr>
+      </p:pic>
+      <p:pic>
+        <p:nvPicPr>
+          <p:cNvPr id="2058" name="Picture 10">
+            <a:extLst>
+              <a:ext uri="{FF2B5EF4-FFF2-40B4-BE49-F238E27FC236}">
+                <a16:creationId xmlns:a16="http://schemas.microsoft.com/office/drawing/2014/main" id="{1505A022-C593-0829-487F-C4D9043A097F}"/>
+              </a:ext>
+            </a:extLst>
+          </p:cNvPr>
+          <p:cNvPicPr>
+            <a:picLocks noGrp="1" noChangeAspect="1" noChangeArrowheads="1"/>
+          </p:cNvPicPr>
+          <p:nvPr>
+            <p:ph sz="half" idx="2"/>
+          </p:nvPr>
+        </p:nvPicPr>
+        <p:blipFill>
+          <a:blip r:embed="rId3">
+            <a:extLst>
+              <a:ext uri="{28A0092B-C50C-407E-A947-70E740481C1C}">
+                <a14:useLocalDpi xmlns:a14="http://schemas.microsoft.com/office/drawing/2010/main" val="0"/>
+              </a:ext>
+            </a:extLst>
+          </a:blip>
+          <a:srcRect/>
+          <a:stretch>
+            <a:fillRect/>
+          </a:stretch>
+        </p:blipFill>
+        <p:spPr bwMode="auto">
+          <a:xfrm>
+            <a:off x="6441776" y="1825625"/>
+            <a:ext cx="4642448" cy="4351338"/>
+          </a:xfrm>
+          <a:prstGeom prst="rect">
+            <a:avLst/>
+          </a:prstGeom>
+          <a:noFill/>
+          <a:extLst>
+            <a:ext uri="{909E8E84-426E-40DD-AFC4-6F175D3DCCD1}">
+              <a14:hiddenFill xmlns:a14="http://schemas.microsoft.com/office/drawing/2010/main">
+                <a:solidFill>
+                  <a:srgbClr val="FFFFFF"/>
+                </a:solidFill>
+              </a14:hiddenFill>
+            </a:ext>
+          </a:extLst>
+        </p:spPr>
+      </p:pic>
+    </p:spTree>
+    <p:extLst>
+      <p:ext uri="{BB962C8B-B14F-4D97-AF65-F5344CB8AC3E}">
+        <p14:creationId xmlns:p14="http://schemas.microsoft.com/office/powerpoint/2010/main" val="1190815264"/>
       </p:ext>
     </p:extLst>
   </p:cSld>

</xml_diff>

<commit_message>
Functions in python scripts
</commit_message>
<xml_diff>
--- a/prezentacja_progres.pptx
+++ b/prezentacja_progres.pptx
@@ -5,7 +5,7 @@
     <p:sldMasterId id="2147483648" r:id="rId1"/>
   </p:sldMasterIdLst>
   <p:notesMasterIdLst>
-    <p:notesMasterId r:id="rId24"/>
+    <p:notesMasterId r:id="rId27"/>
   </p:notesMasterIdLst>
   <p:sldIdLst>
     <p:sldId id="257" r:id="rId2"/>
@@ -30,6 +30,9 @@
     <p:sldId id="279" r:id="rId21"/>
     <p:sldId id="281" r:id="rId22"/>
     <p:sldId id="282" r:id="rId23"/>
+    <p:sldId id="283" r:id="rId24"/>
+    <p:sldId id="284" r:id="rId25"/>
+    <p:sldId id="286" r:id="rId26"/>
   </p:sldIdLst>
   <p:sldSz cx="12192000" cy="6858000"/>
   <p:notesSz cx="6858000" cy="9144000"/>
@@ -155,6 +158,9 @@
             <p14:sldId id="279"/>
             <p14:sldId id="281"/>
             <p14:sldId id="282"/>
+            <p14:sldId id="283"/>
+            <p14:sldId id="284"/>
+            <p14:sldId id="286"/>
           </p14:sldIdLst>
         </p14:section>
       </p14:sectionLst>
@@ -2002,7 +2008,7 @@
           <a:p>
             <a:fld id="{3A98996A-526F-4D12-9A3C-180E559B5F8A}" type="datetimeFigureOut">
               <a:rPr lang="pl-PL" smtClean="0"/>
-              <a:t>08.06.2022</a:t>
+              <a:t>22.06.2022</a:t>
             </a:fld>
             <a:endParaRPr lang="pl-PL"/>
           </a:p>
@@ -2416,7 +2422,7 @@
           <a:p>
             <a:fld id="{25F7A364-0BB9-45DB-85EC-48469DF6681C}" type="datetimeFigureOut">
               <a:rPr lang="pl-PL" smtClean="0"/>
-              <a:t>08.06.2022</a:t>
+              <a:t>22.06.2022</a:t>
             </a:fld>
             <a:endParaRPr lang="pl-PL"/>
           </a:p>
@@ -2614,7 +2620,7 @@
           <a:p>
             <a:fld id="{25F7A364-0BB9-45DB-85EC-48469DF6681C}" type="datetimeFigureOut">
               <a:rPr lang="pl-PL" smtClean="0"/>
-              <a:t>08.06.2022</a:t>
+              <a:t>22.06.2022</a:t>
             </a:fld>
             <a:endParaRPr lang="pl-PL"/>
           </a:p>
@@ -2822,7 +2828,7 @@
           <a:p>
             <a:fld id="{25F7A364-0BB9-45DB-85EC-48469DF6681C}" type="datetimeFigureOut">
               <a:rPr lang="pl-PL" smtClean="0"/>
-              <a:t>08.06.2022</a:t>
+              <a:t>22.06.2022</a:t>
             </a:fld>
             <a:endParaRPr lang="pl-PL"/>
           </a:p>
@@ -3020,7 +3026,7 @@
           <a:p>
             <a:fld id="{25F7A364-0BB9-45DB-85EC-48469DF6681C}" type="datetimeFigureOut">
               <a:rPr lang="pl-PL" smtClean="0"/>
-              <a:t>08.06.2022</a:t>
+              <a:t>22.06.2022</a:t>
             </a:fld>
             <a:endParaRPr lang="pl-PL"/>
           </a:p>
@@ -3295,7 +3301,7 @@
           <a:p>
             <a:fld id="{25F7A364-0BB9-45DB-85EC-48469DF6681C}" type="datetimeFigureOut">
               <a:rPr lang="pl-PL" smtClean="0"/>
-              <a:t>08.06.2022</a:t>
+              <a:t>22.06.2022</a:t>
             </a:fld>
             <a:endParaRPr lang="pl-PL"/>
           </a:p>
@@ -3560,7 +3566,7 @@
           <a:p>
             <a:fld id="{25F7A364-0BB9-45DB-85EC-48469DF6681C}" type="datetimeFigureOut">
               <a:rPr lang="pl-PL" smtClean="0"/>
-              <a:t>08.06.2022</a:t>
+              <a:t>22.06.2022</a:t>
             </a:fld>
             <a:endParaRPr lang="pl-PL"/>
           </a:p>
@@ -3972,7 +3978,7 @@
           <a:p>
             <a:fld id="{25F7A364-0BB9-45DB-85EC-48469DF6681C}" type="datetimeFigureOut">
               <a:rPr lang="pl-PL" smtClean="0"/>
-              <a:t>08.06.2022</a:t>
+              <a:t>22.06.2022</a:t>
             </a:fld>
             <a:endParaRPr lang="pl-PL"/>
           </a:p>
@@ -4113,7 +4119,7 @@
           <a:p>
             <a:fld id="{25F7A364-0BB9-45DB-85EC-48469DF6681C}" type="datetimeFigureOut">
               <a:rPr lang="pl-PL" smtClean="0"/>
-              <a:t>08.06.2022</a:t>
+              <a:t>22.06.2022</a:t>
             </a:fld>
             <a:endParaRPr lang="pl-PL"/>
           </a:p>
@@ -4226,7 +4232,7 @@
           <a:p>
             <a:fld id="{25F7A364-0BB9-45DB-85EC-48469DF6681C}" type="datetimeFigureOut">
               <a:rPr lang="pl-PL" smtClean="0"/>
-              <a:t>08.06.2022</a:t>
+              <a:t>22.06.2022</a:t>
             </a:fld>
             <a:endParaRPr lang="pl-PL"/>
           </a:p>
@@ -4537,7 +4543,7 @@
           <a:p>
             <a:fld id="{25F7A364-0BB9-45DB-85EC-48469DF6681C}" type="datetimeFigureOut">
               <a:rPr lang="pl-PL" smtClean="0"/>
-              <a:t>08.06.2022</a:t>
+              <a:t>22.06.2022</a:t>
             </a:fld>
             <a:endParaRPr lang="pl-PL"/>
           </a:p>
@@ -4825,7 +4831,7 @@
           <a:p>
             <a:fld id="{25F7A364-0BB9-45DB-85EC-48469DF6681C}" type="datetimeFigureOut">
               <a:rPr lang="pl-PL" smtClean="0"/>
-              <a:t>08.06.2022</a:t>
+              <a:t>22.06.2022</a:t>
             </a:fld>
             <a:endParaRPr lang="pl-PL"/>
           </a:p>
@@ -5066,7 +5072,7 @@
           <a:p>
             <a:fld id="{25F7A364-0BB9-45DB-85EC-48469DF6681C}" type="datetimeFigureOut">
               <a:rPr lang="pl-PL" smtClean="0"/>
-              <a:t>08.06.2022</a:t>
+              <a:t>22.06.2022</a:t>
             </a:fld>
             <a:endParaRPr lang="pl-PL"/>
           </a:p>
@@ -8814,6 +8820,850 @@
     <p:extLst>
       <p:ext uri="{BB962C8B-B14F-4D97-AF65-F5344CB8AC3E}">
         <p14:creationId xmlns:p14="http://schemas.microsoft.com/office/powerpoint/2010/main" val="2326969670"/>
+      </p:ext>
+    </p:extLst>
+  </p:cSld>
+  <p:clrMapOvr>
+    <a:masterClrMapping/>
+  </p:clrMapOvr>
+</p:sld>
+</file>
+
+<file path=ppt/slides/slide23.xml><?xml version="1.0" encoding="utf-8"?>
+<p:sld xmlns:a="http://schemas.openxmlformats.org/drawingml/2006/main" xmlns:r="http://schemas.openxmlformats.org/officeDocument/2006/relationships" xmlns:p="http://schemas.openxmlformats.org/presentationml/2006/main">
+  <p:cSld>
+    <p:spTree>
+      <p:nvGrpSpPr>
+        <p:cNvPr id="1" name=""/>
+        <p:cNvGrpSpPr/>
+        <p:nvPr/>
+      </p:nvGrpSpPr>
+      <p:grpSpPr>
+        <a:xfrm>
+          <a:off x="0" y="0"/>
+          <a:ext cx="0" cy="0"/>
+          <a:chOff x="0" y="0"/>
+          <a:chExt cx="0" cy="0"/>
+        </a:xfrm>
+      </p:grpSpPr>
+      <p:sp>
+        <p:nvSpPr>
+          <p:cNvPr id="2" name="Tytuł 1">
+            <a:extLst>
+              <a:ext uri="{FF2B5EF4-FFF2-40B4-BE49-F238E27FC236}">
+                <a16:creationId xmlns:a16="http://schemas.microsoft.com/office/drawing/2014/main" id="{846B20A1-DF77-49E9-9FC9-D8D9FFADA71B}"/>
+              </a:ext>
+            </a:extLst>
+          </p:cNvPr>
+          <p:cNvSpPr>
+            <a:spLocks noGrp="1"/>
+          </p:cNvSpPr>
+          <p:nvPr>
+            <p:ph type="title"/>
+          </p:nvPr>
+        </p:nvSpPr>
+        <p:spPr/>
+        <p:txBody>
+          <a:bodyPr/>
+          <a:lstStyle/>
+          <a:p>
+            <a:r>
+              <a:rPr lang="pl-PL" dirty="0" err="1">
+                <a:solidFill>
+                  <a:schemeClr val="accent1">
+                    <a:lumMod val="75000"/>
+                  </a:schemeClr>
+                </a:solidFill>
+              </a:rPr>
+              <a:t>Multistep</a:t>
+            </a:r>
+            <a:r>
+              <a:rPr lang="pl-PL" dirty="0">
+                <a:solidFill>
+                  <a:schemeClr val="accent1">
+                    <a:lumMod val="75000"/>
+                  </a:schemeClr>
+                </a:solidFill>
+              </a:rPr>
+              <a:t> </a:t>
+            </a:r>
+            <a:r>
+              <a:rPr lang="pl-PL" dirty="0" err="1">
+                <a:solidFill>
+                  <a:schemeClr val="accent1">
+                    <a:lumMod val="75000"/>
+                  </a:schemeClr>
+                </a:solidFill>
+              </a:rPr>
+              <a:t>output</a:t>
+            </a:r>
+            <a:endParaRPr lang="pl-PL" dirty="0">
+              <a:solidFill>
+                <a:schemeClr val="accent1">
+                  <a:lumMod val="75000"/>
+                </a:schemeClr>
+              </a:solidFill>
+            </a:endParaRPr>
+          </a:p>
+        </p:txBody>
+      </p:sp>
+      <p:cxnSp>
+        <p:nvCxnSpPr>
+          <p:cNvPr id="5" name="Łącznik prosty 4">
+            <a:extLst>
+              <a:ext uri="{FF2B5EF4-FFF2-40B4-BE49-F238E27FC236}">
+                <a16:creationId xmlns:a16="http://schemas.microsoft.com/office/drawing/2014/main" id="{3B41ED5C-B54D-4CD7-BD3A-74F3EBB43590}"/>
+              </a:ext>
+            </a:extLst>
+          </p:cNvPr>
+          <p:cNvCxnSpPr/>
+          <p:nvPr/>
+        </p:nvCxnSpPr>
+        <p:spPr>
+          <a:xfrm>
+            <a:off x="0" y="1434517"/>
+            <a:ext cx="12192000" cy="0"/>
+          </a:xfrm>
+          <a:prstGeom prst="line">
+            <a:avLst/>
+          </a:prstGeom>
+          <a:ln w="38100">
+            <a:solidFill>
+              <a:schemeClr val="accent1">
+                <a:lumMod val="75000"/>
+              </a:schemeClr>
+            </a:solidFill>
+          </a:ln>
+        </p:spPr>
+        <p:style>
+          <a:lnRef idx="1">
+            <a:schemeClr val="accent1"/>
+          </a:lnRef>
+          <a:fillRef idx="0">
+            <a:schemeClr val="accent1"/>
+          </a:fillRef>
+          <a:effectRef idx="0">
+            <a:schemeClr val="accent1"/>
+          </a:effectRef>
+          <a:fontRef idx="minor">
+            <a:schemeClr val="tx1"/>
+          </a:fontRef>
+        </p:style>
+      </p:cxnSp>
+      <p:pic>
+        <p:nvPicPr>
+          <p:cNvPr id="10" name="Symbol zastępczy zawartości 9">
+            <a:extLst>
+              <a:ext uri="{FF2B5EF4-FFF2-40B4-BE49-F238E27FC236}">
+                <a16:creationId xmlns:a16="http://schemas.microsoft.com/office/drawing/2014/main" id="{1FFA541B-0BE0-EFF6-A6D8-D5ECC3D1967E}"/>
+              </a:ext>
+            </a:extLst>
+          </p:cNvPr>
+          <p:cNvPicPr>
+            <a:picLocks noGrp="1" noChangeAspect="1"/>
+          </p:cNvPicPr>
+          <p:nvPr>
+            <p:ph sz="half" idx="1"/>
+          </p:nvPr>
+        </p:nvPicPr>
+        <p:blipFill>
+          <a:blip r:embed="rId2">
+            <a:extLst>
+              <a:ext uri="{28A0092B-C50C-407E-A947-70E740481C1C}">
+                <a14:useLocalDpi xmlns:a14="http://schemas.microsoft.com/office/drawing/2010/main" val="0"/>
+              </a:ext>
+            </a:extLst>
+          </a:blip>
+          <a:stretch>
+            <a:fillRect/>
+          </a:stretch>
+        </p:blipFill>
+        <p:spPr>
+          <a:xfrm>
+            <a:off x="276266" y="1892708"/>
+            <a:ext cx="5181600" cy="2683933"/>
+          </a:xfrm>
+        </p:spPr>
+      </p:pic>
+      <p:pic>
+        <p:nvPicPr>
+          <p:cNvPr id="13" name="Symbol zastępczy zawartości 12">
+            <a:extLst>
+              <a:ext uri="{FF2B5EF4-FFF2-40B4-BE49-F238E27FC236}">
+                <a16:creationId xmlns:a16="http://schemas.microsoft.com/office/drawing/2014/main" id="{52F4B564-4751-5A66-5C7B-2CD0A08F1D1D}"/>
+              </a:ext>
+            </a:extLst>
+          </p:cNvPr>
+          <p:cNvPicPr>
+            <a:picLocks noGrp="1" noChangeAspect="1"/>
+          </p:cNvPicPr>
+          <p:nvPr>
+            <p:ph sz="half" idx="2"/>
+          </p:nvPr>
+        </p:nvPicPr>
+        <p:blipFill>
+          <a:blip r:embed="rId3">
+            <a:extLst>
+              <a:ext uri="{28A0092B-C50C-407E-A947-70E740481C1C}">
+                <a14:useLocalDpi xmlns:a14="http://schemas.microsoft.com/office/drawing/2010/main" val="0"/>
+              </a:ext>
+            </a:extLst>
+          </a:blip>
+          <a:stretch>
+            <a:fillRect/>
+          </a:stretch>
+        </p:blipFill>
+        <p:spPr>
+          <a:xfrm>
+            <a:off x="6172200" y="1859524"/>
+            <a:ext cx="5181600" cy="2750300"/>
+          </a:xfrm>
+        </p:spPr>
+      </p:pic>
+      <p:pic>
+        <p:nvPicPr>
+          <p:cNvPr id="15" name="Obraz 14">
+            <a:extLst>
+              <a:ext uri="{FF2B5EF4-FFF2-40B4-BE49-F238E27FC236}">
+                <a16:creationId xmlns:a16="http://schemas.microsoft.com/office/drawing/2014/main" id="{A9A541E4-8B5C-AFD4-9EE5-988650E39312}"/>
+              </a:ext>
+            </a:extLst>
+          </p:cNvPr>
+          <p:cNvPicPr>
+            <a:picLocks noChangeAspect="1"/>
+          </p:cNvPicPr>
+          <p:nvPr/>
+        </p:nvPicPr>
+        <p:blipFill>
+          <a:blip r:embed="rId4">
+            <a:extLst>
+              <a:ext uri="{28A0092B-C50C-407E-A947-70E740481C1C}">
+                <a14:useLocalDpi xmlns:a14="http://schemas.microsoft.com/office/drawing/2010/main" val="0"/>
+              </a:ext>
+            </a:extLst>
+          </a:blip>
+          <a:stretch>
+            <a:fillRect/>
+          </a:stretch>
+        </p:blipFill>
+        <p:spPr>
+          <a:xfrm>
+            <a:off x="4320586" y="3236685"/>
+            <a:ext cx="4827100" cy="3150318"/>
+          </a:xfrm>
+          <a:prstGeom prst="rect">
+            <a:avLst/>
+          </a:prstGeom>
+        </p:spPr>
+      </p:pic>
+    </p:spTree>
+    <p:extLst>
+      <p:ext uri="{BB962C8B-B14F-4D97-AF65-F5344CB8AC3E}">
+        <p14:creationId xmlns:p14="http://schemas.microsoft.com/office/powerpoint/2010/main" val="3861383167"/>
+      </p:ext>
+    </p:extLst>
+  </p:cSld>
+  <p:clrMapOvr>
+    <a:masterClrMapping/>
+  </p:clrMapOvr>
+</p:sld>
+</file>
+
+<file path=ppt/slides/slide24.xml><?xml version="1.0" encoding="utf-8"?>
+<p:sld xmlns:a="http://schemas.openxmlformats.org/drawingml/2006/main" xmlns:r="http://schemas.openxmlformats.org/officeDocument/2006/relationships" xmlns:p="http://schemas.openxmlformats.org/presentationml/2006/main">
+  <p:cSld>
+    <p:spTree>
+      <p:nvGrpSpPr>
+        <p:cNvPr id="1" name=""/>
+        <p:cNvGrpSpPr/>
+        <p:nvPr/>
+      </p:nvGrpSpPr>
+      <p:grpSpPr>
+        <a:xfrm>
+          <a:off x="0" y="0"/>
+          <a:ext cx="0" cy="0"/>
+          <a:chOff x="0" y="0"/>
+          <a:chExt cx="0" cy="0"/>
+        </a:xfrm>
+      </p:grpSpPr>
+      <p:sp>
+        <p:nvSpPr>
+          <p:cNvPr id="2" name="Tytuł 1">
+            <a:extLst>
+              <a:ext uri="{FF2B5EF4-FFF2-40B4-BE49-F238E27FC236}">
+                <a16:creationId xmlns:a16="http://schemas.microsoft.com/office/drawing/2014/main" id="{846B20A1-DF77-49E9-9FC9-D8D9FFADA71B}"/>
+              </a:ext>
+            </a:extLst>
+          </p:cNvPr>
+          <p:cNvSpPr>
+            <a:spLocks noGrp="1"/>
+          </p:cNvSpPr>
+          <p:nvPr>
+            <p:ph type="title"/>
+          </p:nvPr>
+        </p:nvSpPr>
+        <p:spPr/>
+        <p:txBody>
+          <a:bodyPr/>
+          <a:lstStyle/>
+          <a:p>
+            <a:r>
+              <a:rPr lang="pl-PL" dirty="0" err="1">
+                <a:solidFill>
+                  <a:schemeClr val="accent1">
+                    <a:lumMod val="75000"/>
+                  </a:schemeClr>
+                </a:solidFill>
+              </a:rPr>
+              <a:t>Predictions</a:t>
+            </a:r>
+            <a:r>
+              <a:rPr lang="pl-PL" dirty="0">
+                <a:solidFill>
+                  <a:schemeClr val="accent1">
+                    <a:lumMod val="75000"/>
+                  </a:schemeClr>
+                </a:solidFill>
+              </a:rPr>
+              <a:t> for </a:t>
+            </a:r>
+            <a:r>
+              <a:rPr lang="pl-PL" dirty="0" err="1">
+                <a:solidFill>
+                  <a:schemeClr val="accent1">
+                    <a:lumMod val="75000"/>
+                  </a:schemeClr>
+                </a:solidFill>
+              </a:rPr>
+              <a:t>different</a:t>
+            </a:r>
+            <a:r>
+              <a:rPr lang="pl-PL" dirty="0">
+                <a:solidFill>
+                  <a:schemeClr val="accent1">
+                    <a:lumMod val="75000"/>
+                  </a:schemeClr>
+                </a:solidFill>
+              </a:rPr>
+              <a:t> </a:t>
+            </a:r>
+            <a:r>
+              <a:rPr lang="pl-PL" dirty="0" err="1">
+                <a:solidFill>
+                  <a:schemeClr val="accent1">
+                    <a:lumMod val="75000"/>
+                  </a:schemeClr>
+                </a:solidFill>
+              </a:rPr>
+              <a:t>timesteps</a:t>
+            </a:r>
+            <a:r>
+              <a:rPr lang="pl-PL" dirty="0">
+                <a:solidFill>
+                  <a:schemeClr val="accent1">
+                    <a:lumMod val="75000"/>
+                  </a:schemeClr>
+                </a:solidFill>
+              </a:rPr>
+              <a:t> </a:t>
+            </a:r>
+            <a:r>
+              <a:rPr lang="pl-PL" dirty="0" err="1">
+                <a:solidFill>
+                  <a:schemeClr val="accent1">
+                    <a:lumMod val="75000"/>
+                  </a:schemeClr>
+                </a:solidFill>
+              </a:rPr>
+              <a:t>ahead</a:t>
+            </a:r>
+            <a:endParaRPr lang="pl-PL" dirty="0">
+              <a:solidFill>
+                <a:schemeClr val="accent1">
+                  <a:lumMod val="75000"/>
+                </a:schemeClr>
+              </a:solidFill>
+            </a:endParaRPr>
+          </a:p>
+        </p:txBody>
+      </p:sp>
+      <p:sp>
+        <p:nvSpPr>
+          <p:cNvPr id="8" name="Symbol zastępczy tekstu 7">
+            <a:extLst>
+              <a:ext uri="{FF2B5EF4-FFF2-40B4-BE49-F238E27FC236}">
+                <a16:creationId xmlns:a16="http://schemas.microsoft.com/office/drawing/2014/main" id="{4F35F36B-E945-0EB3-FDB5-270C5DB055B9}"/>
+              </a:ext>
+            </a:extLst>
+          </p:cNvPr>
+          <p:cNvSpPr>
+            <a:spLocks noGrp="1"/>
+          </p:cNvSpPr>
+          <p:nvPr>
+            <p:ph type="body" idx="1"/>
+          </p:nvPr>
+        </p:nvSpPr>
+        <p:spPr/>
+        <p:txBody>
+          <a:bodyPr/>
+          <a:lstStyle/>
+          <a:p>
+            <a:r>
+              <a:rPr lang="pl-PL" dirty="0"/>
+              <a:t>Wind_10</a:t>
+            </a:r>
+            <a:endParaRPr lang="en-GB" dirty="0"/>
+          </a:p>
+        </p:txBody>
+      </p:sp>
+      <p:pic>
+        <p:nvPicPr>
+          <p:cNvPr id="15" name="Symbol zastępczy zawartości 14">
+            <a:extLst>
+              <a:ext uri="{FF2B5EF4-FFF2-40B4-BE49-F238E27FC236}">
+                <a16:creationId xmlns:a16="http://schemas.microsoft.com/office/drawing/2014/main" id="{080681DE-DA0B-4AC4-DF4C-C2134D72A452}"/>
+              </a:ext>
+            </a:extLst>
+          </p:cNvPr>
+          <p:cNvPicPr>
+            <a:picLocks noGrp="1" noChangeAspect="1"/>
+          </p:cNvPicPr>
+          <p:nvPr>
+            <p:ph sz="half" idx="2"/>
+          </p:nvPr>
+        </p:nvPicPr>
+        <p:blipFill>
+          <a:blip r:embed="rId2">
+            <a:extLst>
+              <a:ext uri="{28A0092B-C50C-407E-A947-70E740481C1C}">
+                <a14:useLocalDpi xmlns:a14="http://schemas.microsoft.com/office/drawing/2010/main" val="0"/>
+              </a:ext>
+            </a:extLst>
+          </a:blip>
+          <a:stretch>
+            <a:fillRect/>
+          </a:stretch>
+        </p:blipFill>
+        <p:spPr>
+          <a:xfrm>
+            <a:off x="839788" y="2978539"/>
+            <a:ext cx="5157787" cy="2737660"/>
+          </a:xfrm>
+        </p:spPr>
+      </p:pic>
+      <p:sp>
+        <p:nvSpPr>
+          <p:cNvPr id="11" name="Symbol zastępczy tekstu 10">
+            <a:extLst>
+              <a:ext uri="{FF2B5EF4-FFF2-40B4-BE49-F238E27FC236}">
+                <a16:creationId xmlns:a16="http://schemas.microsoft.com/office/drawing/2014/main" id="{4D99514A-A90E-0B48-918A-1191576F16F5}"/>
+              </a:ext>
+            </a:extLst>
+          </p:cNvPr>
+          <p:cNvSpPr>
+            <a:spLocks noGrp="1"/>
+          </p:cNvSpPr>
+          <p:nvPr>
+            <p:ph type="body" sz="quarter" idx="3"/>
+          </p:nvPr>
+        </p:nvSpPr>
+        <p:spPr/>
+        <p:txBody>
+          <a:bodyPr/>
+          <a:lstStyle/>
+          <a:p>
+            <a:r>
+              <a:rPr lang="pl-PL" dirty="0"/>
+              <a:t>Wind_100</a:t>
+            </a:r>
+            <a:endParaRPr lang="en-GB" dirty="0"/>
+          </a:p>
+        </p:txBody>
+      </p:sp>
+      <p:pic>
+        <p:nvPicPr>
+          <p:cNvPr id="17" name="Symbol zastępczy zawartości 16">
+            <a:extLst>
+              <a:ext uri="{FF2B5EF4-FFF2-40B4-BE49-F238E27FC236}">
+                <a16:creationId xmlns:a16="http://schemas.microsoft.com/office/drawing/2014/main" id="{B5E2020B-D0CF-0AAB-2B16-21158121B536}"/>
+              </a:ext>
+            </a:extLst>
+          </p:cNvPr>
+          <p:cNvPicPr>
+            <a:picLocks noGrp="1" noChangeAspect="1"/>
+          </p:cNvPicPr>
+          <p:nvPr>
+            <p:ph sz="quarter" idx="4"/>
+          </p:nvPr>
+        </p:nvPicPr>
+        <p:blipFill>
+          <a:blip r:embed="rId3">
+            <a:extLst>
+              <a:ext uri="{28A0092B-C50C-407E-A947-70E740481C1C}">
+                <a14:useLocalDpi xmlns:a14="http://schemas.microsoft.com/office/drawing/2010/main" val="0"/>
+              </a:ext>
+            </a:extLst>
+          </a:blip>
+          <a:stretch>
+            <a:fillRect/>
+          </a:stretch>
+        </p:blipFill>
+        <p:spPr>
+          <a:xfrm>
+            <a:off x="6172200" y="2971797"/>
+            <a:ext cx="5183188" cy="2751143"/>
+          </a:xfrm>
+        </p:spPr>
+      </p:pic>
+      <p:cxnSp>
+        <p:nvCxnSpPr>
+          <p:cNvPr id="5" name="Łącznik prosty 4">
+            <a:extLst>
+              <a:ext uri="{FF2B5EF4-FFF2-40B4-BE49-F238E27FC236}">
+                <a16:creationId xmlns:a16="http://schemas.microsoft.com/office/drawing/2014/main" id="{3B41ED5C-B54D-4CD7-BD3A-74F3EBB43590}"/>
+              </a:ext>
+            </a:extLst>
+          </p:cNvPr>
+          <p:cNvCxnSpPr/>
+          <p:nvPr/>
+        </p:nvCxnSpPr>
+        <p:spPr>
+          <a:xfrm>
+            <a:off x="0" y="1434517"/>
+            <a:ext cx="12192000" cy="0"/>
+          </a:xfrm>
+          <a:prstGeom prst="line">
+            <a:avLst/>
+          </a:prstGeom>
+          <a:ln w="38100">
+            <a:solidFill>
+              <a:schemeClr val="accent1">
+                <a:lumMod val="75000"/>
+              </a:schemeClr>
+            </a:solidFill>
+          </a:ln>
+        </p:spPr>
+        <p:style>
+          <a:lnRef idx="1">
+            <a:schemeClr val="accent1"/>
+          </a:lnRef>
+          <a:fillRef idx="0">
+            <a:schemeClr val="accent1"/>
+          </a:fillRef>
+          <a:effectRef idx="0">
+            <a:schemeClr val="accent1"/>
+          </a:effectRef>
+          <a:fontRef idx="minor">
+            <a:schemeClr val="tx1"/>
+          </a:fontRef>
+        </p:style>
+      </p:cxnSp>
+    </p:spTree>
+    <p:extLst>
+      <p:ext uri="{BB962C8B-B14F-4D97-AF65-F5344CB8AC3E}">
+        <p14:creationId xmlns:p14="http://schemas.microsoft.com/office/powerpoint/2010/main" val="660143941"/>
+      </p:ext>
+    </p:extLst>
+  </p:cSld>
+  <p:clrMapOvr>
+    <a:masterClrMapping/>
+  </p:clrMapOvr>
+</p:sld>
+</file>
+
+<file path=ppt/slides/slide25.xml><?xml version="1.0" encoding="utf-8"?>
+<p:sld xmlns:a="http://schemas.openxmlformats.org/drawingml/2006/main" xmlns:r="http://schemas.openxmlformats.org/officeDocument/2006/relationships" xmlns:p="http://schemas.openxmlformats.org/presentationml/2006/main">
+  <p:cSld>
+    <p:spTree>
+      <p:nvGrpSpPr>
+        <p:cNvPr id="1" name=""/>
+        <p:cNvGrpSpPr/>
+        <p:nvPr/>
+      </p:nvGrpSpPr>
+      <p:grpSpPr>
+        <a:xfrm>
+          <a:off x="0" y="0"/>
+          <a:ext cx="0" cy="0"/>
+          <a:chOff x="0" y="0"/>
+          <a:chExt cx="0" cy="0"/>
+        </a:xfrm>
+      </p:grpSpPr>
+      <p:sp>
+        <p:nvSpPr>
+          <p:cNvPr id="2" name="Tytuł 1">
+            <a:extLst>
+              <a:ext uri="{FF2B5EF4-FFF2-40B4-BE49-F238E27FC236}">
+                <a16:creationId xmlns:a16="http://schemas.microsoft.com/office/drawing/2014/main" id="{846B20A1-DF77-49E9-9FC9-D8D9FFADA71B}"/>
+              </a:ext>
+            </a:extLst>
+          </p:cNvPr>
+          <p:cNvSpPr>
+            <a:spLocks noGrp="1"/>
+          </p:cNvSpPr>
+          <p:nvPr>
+            <p:ph type="title"/>
+          </p:nvPr>
+        </p:nvSpPr>
+        <p:spPr/>
+        <p:txBody>
+          <a:bodyPr/>
+          <a:lstStyle/>
+          <a:p>
+            <a:r>
+              <a:rPr lang="pl-PL" dirty="0" err="1">
+                <a:solidFill>
+                  <a:schemeClr val="accent1">
+                    <a:lumMod val="75000"/>
+                  </a:schemeClr>
+                </a:solidFill>
+              </a:rPr>
+              <a:t>Predictions</a:t>
+            </a:r>
+            <a:r>
+              <a:rPr lang="pl-PL" dirty="0">
+                <a:solidFill>
+                  <a:schemeClr val="accent1">
+                    <a:lumMod val="75000"/>
+                  </a:schemeClr>
+                </a:solidFill>
+              </a:rPr>
+              <a:t> for </a:t>
+            </a:r>
+            <a:r>
+              <a:rPr lang="pl-PL" dirty="0" err="1">
+                <a:solidFill>
+                  <a:schemeClr val="accent1">
+                    <a:lumMod val="75000"/>
+                  </a:schemeClr>
+                </a:solidFill>
+              </a:rPr>
+              <a:t>different</a:t>
+            </a:r>
+            <a:r>
+              <a:rPr lang="pl-PL" dirty="0">
+                <a:solidFill>
+                  <a:schemeClr val="accent1">
+                    <a:lumMod val="75000"/>
+                  </a:schemeClr>
+                </a:solidFill>
+              </a:rPr>
+              <a:t> </a:t>
+            </a:r>
+            <a:r>
+              <a:rPr lang="pl-PL" dirty="0" err="1">
+                <a:solidFill>
+                  <a:schemeClr val="accent1">
+                    <a:lumMod val="75000"/>
+                  </a:schemeClr>
+                </a:solidFill>
+              </a:rPr>
+              <a:t>timesteps</a:t>
+            </a:r>
+            <a:r>
+              <a:rPr lang="pl-PL" dirty="0">
+                <a:solidFill>
+                  <a:schemeClr val="accent1">
+                    <a:lumMod val="75000"/>
+                  </a:schemeClr>
+                </a:solidFill>
+              </a:rPr>
+              <a:t> </a:t>
+            </a:r>
+            <a:r>
+              <a:rPr lang="pl-PL" dirty="0" err="1">
+                <a:solidFill>
+                  <a:schemeClr val="accent1">
+                    <a:lumMod val="75000"/>
+                  </a:schemeClr>
+                </a:solidFill>
+              </a:rPr>
+              <a:t>ahead</a:t>
+            </a:r>
+            <a:endParaRPr lang="pl-PL" dirty="0">
+              <a:solidFill>
+                <a:schemeClr val="accent1">
+                  <a:lumMod val="75000"/>
+                </a:schemeClr>
+              </a:solidFill>
+            </a:endParaRPr>
+          </a:p>
+        </p:txBody>
+      </p:sp>
+      <p:sp>
+        <p:nvSpPr>
+          <p:cNvPr id="8" name="Symbol zastępczy tekstu 7">
+            <a:extLst>
+              <a:ext uri="{FF2B5EF4-FFF2-40B4-BE49-F238E27FC236}">
+                <a16:creationId xmlns:a16="http://schemas.microsoft.com/office/drawing/2014/main" id="{4F35F36B-E945-0EB3-FDB5-270C5DB055B9}"/>
+              </a:ext>
+            </a:extLst>
+          </p:cNvPr>
+          <p:cNvSpPr>
+            <a:spLocks noGrp="1"/>
+          </p:cNvSpPr>
+          <p:nvPr>
+            <p:ph type="body" idx="1"/>
+          </p:nvPr>
+        </p:nvSpPr>
+        <p:spPr/>
+        <p:txBody>
+          <a:bodyPr/>
+          <a:lstStyle/>
+          <a:p>
+            <a:r>
+              <a:rPr lang="pl-PL" dirty="0" err="1"/>
+              <a:t>Temperature</a:t>
+            </a:r>
+            <a:endParaRPr lang="en-GB" dirty="0"/>
+          </a:p>
+        </p:txBody>
+      </p:sp>
+      <p:sp>
+        <p:nvSpPr>
+          <p:cNvPr id="11" name="Symbol zastępczy tekstu 10">
+            <a:extLst>
+              <a:ext uri="{FF2B5EF4-FFF2-40B4-BE49-F238E27FC236}">
+                <a16:creationId xmlns:a16="http://schemas.microsoft.com/office/drawing/2014/main" id="{4D99514A-A90E-0B48-918A-1191576F16F5}"/>
+              </a:ext>
+            </a:extLst>
+          </p:cNvPr>
+          <p:cNvSpPr>
+            <a:spLocks noGrp="1"/>
+          </p:cNvSpPr>
+          <p:nvPr>
+            <p:ph type="body" sz="quarter" idx="3"/>
+          </p:nvPr>
+        </p:nvSpPr>
+        <p:spPr/>
+        <p:txBody>
+          <a:bodyPr/>
+          <a:lstStyle/>
+          <a:p>
+            <a:r>
+              <a:rPr lang="pl-PL" dirty="0" err="1"/>
+              <a:t>Pressure</a:t>
+            </a:r>
+            <a:endParaRPr lang="en-GB" dirty="0"/>
+          </a:p>
+        </p:txBody>
+      </p:sp>
+      <p:cxnSp>
+        <p:nvCxnSpPr>
+          <p:cNvPr id="5" name="Łącznik prosty 4">
+            <a:extLst>
+              <a:ext uri="{FF2B5EF4-FFF2-40B4-BE49-F238E27FC236}">
+                <a16:creationId xmlns:a16="http://schemas.microsoft.com/office/drawing/2014/main" id="{3B41ED5C-B54D-4CD7-BD3A-74F3EBB43590}"/>
+              </a:ext>
+            </a:extLst>
+          </p:cNvPr>
+          <p:cNvCxnSpPr/>
+          <p:nvPr/>
+        </p:nvCxnSpPr>
+        <p:spPr>
+          <a:xfrm>
+            <a:off x="0" y="1434517"/>
+            <a:ext cx="12192000" cy="0"/>
+          </a:xfrm>
+          <a:prstGeom prst="line">
+            <a:avLst/>
+          </a:prstGeom>
+          <a:ln w="38100">
+            <a:solidFill>
+              <a:schemeClr val="accent1">
+                <a:lumMod val="75000"/>
+              </a:schemeClr>
+            </a:solidFill>
+          </a:ln>
+        </p:spPr>
+        <p:style>
+          <a:lnRef idx="1">
+            <a:schemeClr val="accent1"/>
+          </a:lnRef>
+          <a:fillRef idx="0">
+            <a:schemeClr val="accent1"/>
+          </a:fillRef>
+          <a:effectRef idx="0">
+            <a:schemeClr val="accent1"/>
+          </a:effectRef>
+          <a:fontRef idx="minor">
+            <a:schemeClr val="tx1"/>
+          </a:fontRef>
+        </p:style>
+      </p:cxnSp>
+      <p:pic>
+        <p:nvPicPr>
+          <p:cNvPr id="10" name="Symbol zastępczy zawartości 9">
+            <a:extLst>
+              <a:ext uri="{FF2B5EF4-FFF2-40B4-BE49-F238E27FC236}">
+                <a16:creationId xmlns:a16="http://schemas.microsoft.com/office/drawing/2014/main" id="{CDF24375-F414-8D27-5EA2-60169F471FA0}"/>
+              </a:ext>
+            </a:extLst>
+          </p:cNvPr>
+          <p:cNvPicPr>
+            <a:picLocks noGrp="1" noChangeAspect="1"/>
+          </p:cNvPicPr>
+          <p:nvPr>
+            <p:ph sz="half" idx="2"/>
+          </p:nvPr>
+        </p:nvPicPr>
+        <p:blipFill>
+          <a:blip r:embed="rId2">
+            <a:extLst>
+              <a:ext uri="{28A0092B-C50C-407E-A947-70E740481C1C}">
+                <a14:useLocalDpi xmlns:a14="http://schemas.microsoft.com/office/drawing/2010/main" val="0"/>
+              </a:ext>
+            </a:extLst>
+          </a:blip>
+          <a:stretch>
+            <a:fillRect/>
+          </a:stretch>
+        </p:blipFill>
+        <p:spPr>
+          <a:xfrm>
+            <a:off x="839788" y="2994298"/>
+            <a:ext cx="5157787" cy="2706141"/>
+          </a:xfrm>
+        </p:spPr>
+      </p:pic>
+      <p:pic>
+        <p:nvPicPr>
+          <p:cNvPr id="13" name="Symbol zastępczy zawartości 12">
+            <a:extLst>
+              <a:ext uri="{FF2B5EF4-FFF2-40B4-BE49-F238E27FC236}">
+                <a16:creationId xmlns:a16="http://schemas.microsoft.com/office/drawing/2014/main" id="{03632D26-0062-51CB-B3EE-E16642D599E4}"/>
+              </a:ext>
+            </a:extLst>
+          </p:cNvPr>
+          <p:cNvPicPr>
+            <a:picLocks noGrp="1" noChangeAspect="1"/>
+          </p:cNvPicPr>
+          <p:nvPr>
+            <p:ph sz="quarter" idx="4"/>
+          </p:nvPr>
+        </p:nvPicPr>
+        <p:blipFill>
+          <a:blip r:embed="rId3">
+            <a:extLst>
+              <a:ext uri="{28A0092B-C50C-407E-A947-70E740481C1C}">
+                <a14:useLocalDpi xmlns:a14="http://schemas.microsoft.com/office/drawing/2010/main" val="0"/>
+              </a:ext>
+            </a:extLst>
+          </a:blip>
+          <a:stretch>
+            <a:fillRect/>
+          </a:stretch>
+        </p:blipFill>
+        <p:spPr>
+          <a:xfrm>
+            <a:off x="6172200" y="2987635"/>
+            <a:ext cx="5183188" cy="2719468"/>
+          </a:xfrm>
+        </p:spPr>
+      </p:pic>
+    </p:spTree>
+    <p:extLst>
+      <p:ext uri="{BB962C8B-B14F-4D97-AF65-F5344CB8AC3E}">
+        <p14:creationId xmlns:p14="http://schemas.microsoft.com/office/powerpoint/2010/main" val="2620848564"/>
       </p:ext>
     </p:extLst>
   </p:cSld>

</xml_diff>